<commit_message>
docs: finished slides for presentation?
</commit_message>
<xml_diff>
--- a/presentation_slides/Terraharbor_PDG_groupe04A.pptx
+++ b/presentation_slides/Terraharbor_PDG_groupe04A.pptx
@@ -139,7 +139,7 @@
       </p:grpSpPr>
       <p:sp>
         <p:nvSpPr>
-          <p:cNvPr id="538960197" name="Header Placeholder 1"/>
+          <p:cNvPr id="1295448840" name="Header Placeholder 1"/>
           <p:cNvSpPr>
             <a:spLocks noGrp="1"/>
           </p:cNvSpPr>
@@ -173,7 +173,7 @@
       </p:sp>
       <p:sp>
         <p:nvSpPr>
-          <p:cNvPr id="355465414" name="Date Placeholder 2"/>
+          <p:cNvPr id="1259647941" name="Date Placeholder 2"/>
           <p:cNvSpPr>
             <a:spLocks noGrp="1"/>
           </p:cNvSpPr>
@@ -211,7 +211,7 @@
       </p:sp>
       <p:sp>
         <p:nvSpPr>
-          <p:cNvPr id="22100866" name="Slide Image Placeholder 3"/>
+          <p:cNvPr id="1885301896" name="Slide Image Placeholder 3"/>
           <p:cNvSpPr>
             <a:spLocks noChangeAspect="1" noGrp="1" noRot="1"/>
           </p:cNvSpPr>
@@ -247,7 +247,7 @@
       </p:sp>
       <p:sp>
         <p:nvSpPr>
-          <p:cNvPr id="1746271641" name="Notes Placeholder 4"/>
+          <p:cNvPr id="1534236023" name="Notes Placeholder 4"/>
           <p:cNvSpPr>
             <a:spLocks noGrp="1"/>
           </p:cNvSpPr>
@@ -321,7 +321,7 @@
       </p:sp>
       <p:sp>
         <p:nvSpPr>
-          <p:cNvPr id="1452258294" name="Footer Placeholder 5"/>
+          <p:cNvPr id="533127095" name="Footer Placeholder 5"/>
           <p:cNvSpPr>
             <a:spLocks noGrp="1"/>
           </p:cNvSpPr>
@@ -355,7 +355,7 @@
       </p:sp>
       <p:sp>
         <p:nvSpPr>
-          <p:cNvPr id="1970072076" name="Slide Number Placeholder 6"/>
+          <p:cNvPr id="1325232505" name="Slide Number Placeholder 6"/>
           <p:cNvSpPr>
             <a:spLocks noGrp="1"/>
           </p:cNvSpPr>
@@ -508,7 +508,7 @@
       </p:grpSpPr>
       <p:sp>
         <p:nvSpPr>
-          <p:cNvPr id="419460804" name="Slide Image Placeholder 1"/>
+          <p:cNvPr id="1071061473" name="Slide Image Placeholder 1"/>
           <p:cNvSpPr>
             <a:spLocks noChangeAspect="1" noGrp="1" noRot="1"/>
           </p:cNvSpPr>
@@ -525,7 +525,7 @@
       </p:sp>
       <p:sp>
         <p:nvSpPr>
-          <p:cNvPr id="426202087" name="Notes Placeholder 2"/>
+          <p:cNvPr id="1647606491" name="Notes Placeholder 2"/>
           <p:cNvSpPr>
             <a:spLocks noGrp="1"/>
           </p:cNvSpPr>
@@ -550,7 +550,7 @@
       </p:sp>
       <p:sp>
         <p:nvSpPr>
-          <p:cNvPr id="708163616" name="Slide Number Placeholder 3"/>
+          <p:cNvPr id="591351797" name="Slide Number Placeholder 3"/>
           <p:cNvSpPr>
             <a:spLocks noGrp="1"/>
           </p:cNvSpPr>
@@ -601,7 +601,7 @@
       </p:grpSpPr>
       <p:sp>
         <p:nvSpPr>
-          <p:cNvPr id="1434883708" name="Slide Image Placeholder 1"/>
+          <p:cNvPr id="453869921" name="Slide Image Placeholder 1"/>
           <p:cNvSpPr>
             <a:spLocks noChangeAspect="1" noGrp="1" noRot="1"/>
           </p:cNvSpPr>
@@ -613,7 +613,7 @@
       </p:sp>
       <p:sp>
         <p:nvSpPr>
-          <p:cNvPr id="156436534" name="Notes Placeholder 2"/>
+          <p:cNvPr id="1522127892" name="Notes Placeholder 2"/>
           <p:cNvSpPr>
             <a:spLocks noGrp="1"/>
           </p:cNvSpPr>
@@ -635,7 +635,7 @@
       </p:sp>
       <p:sp>
         <p:nvSpPr>
-          <p:cNvPr id="1804878888" name="Slide Number Placeholder 3"/>
+          <p:cNvPr id="1026310394" name="Slide Number Placeholder 3"/>
           <p:cNvSpPr>
             <a:spLocks noGrp="1"/>
           </p:cNvSpPr>
@@ -686,7 +686,7 @@
       </p:grpSpPr>
       <p:sp>
         <p:nvSpPr>
-          <p:cNvPr id="2" name="Slide Image Placeholder 1"/>
+          <p:cNvPr id="1127498772" name="Slide Image Placeholder 1"/>
           <p:cNvSpPr>
             <a:spLocks noChangeAspect="1" noGrp="1" noRot="1"/>
           </p:cNvSpPr>
@@ -698,7 +698,7 @@
       </p:sp>
       <p:sp>
         <p:nvSpPr>
-          <p:cNvPr id="3" name="Notes Placeholder 2"/>
+          <p:cNvPr id="600732509" name="Notes Placeholder 2"/>
           <p:cNvSpPr>
             <a:spLocks noGrp="1"/>
           </p:cNvSpPr>
@@ -720,7 +720,7 @@
       </p:sp>
       <p:sp>
         <p:nvSpPr>
-          <p:cNvPr id="4" name="Slide Number Placeholder 3"/>
+          <p:cNvPr id="42353382" name="Slide Number Placeholder 3"/>
           <p:cNvSpPr>
             <a:spLocks noGrp="1"/>
           </p:cNvSpPr>
@@ -771,7 +771,7 @@
       </p:grpSpPr>
       <p:sp>
         <p:nvSpPr>
-          <p:cNvPr id="327545737" name="Slide Image Placeholder 1"/>
+          <p:cNvPr id="2070664945" name="Slide Image Placeholder 1"/>
           <p:cNvSpPr>
             <a:spLocks noChangeAspect="1" noGrp="1" noRot="1"/>
           </p:cNvSpPr>
@@ -783,7 +783,7 @@
       </p:sp>
       <p:sp>
         <p:nvSpPr>
-          <p:cNvPr id="438296907" name="Notes Placeholder 2"/>
+          <p:cNvPr id="865127652" name="Notes Placeholder 2"/>
           <p:cNvSpPr>
             <a:spLocks noGrp="1"/>
           </p:cNvSpPr>
@@ -805,7 +805,7 @@
       </p:sp>
       <p:sp>
         <p:nvSpPr>
-          <p:cNvPr id="657557825" name="Slide Number Placeholder 3"/>
+          <p:cNvPr id="322417650" name="Slide Number Placeholder 3"/>
           <p:cNvSpPr>
             <a:spLocks noGrp="1"/>
           </p:cNvSpPr>
@@ -856,7 +856,7 @@
       </p:grpSpPr>
       <p:sp>
         <p:nvSpPr>
-          <p:cNvPr id="192796345" name="Slide Image Placeholder 1"/>
+          <p:cNvPr id="1096801202" name="Slide Image Placeholder 1"/>
           <p:cNvSpPr>
             <a:spLocks noChangeAspect="1" noGrp="1" noRot="1"/>
           </p:cNvSpPr>
@@ -868,7 +868,7 @@
       </p:sp>
       <p:sp>
         <p:nvSpPr>
-          <p:cNvPr id="227182995" name="Notes Placeholder 2"/>
+          <p:cNvPr id="1906059089" name="Notes Placeholder 2"/>
           <p:cNvSpPr>
             <a:spLocks noGrp="1"/>
           </p:cNvSpPr>
@@ -890,7 +890,7 @@
       </p:sp>
       <p:sp>
         <p:nvSpPr>
-          <p:cNvPr id="1830907797" name="Slide Number Placeholder 3"/>
+          <p:cNvPr id="411591644" name="Slide Number Placeholder 3"/>
           <p:cNvSpPr>
             <a:spLocks noGrp="1"/>
           </p:cNvSpPr>
@@ -941,7 +941,7 @@
       </p:grpSpPr>
       <p:sp>
         <p:nvSpPr>
-          <p:cNvPr id="226677890" name="Slide Image Placeholder 1"/>
+          <p:cNvPr id="1724080180" name="Slide Image Placeholder 1"/>
           <p:cNvSpPr>
             <a:spLocks noChangeAspect="1" noGrp="1" noRot="1"/>
           </p:cNvSpPr>
@@ -953,7 +953,7 @@
       </p:sp>
       <p:sp>
         <p:nvSpPr>
-          <p:cNvPr id="1281733639" name="Notes Placeholder 2"/>
+          <p:cNvPr id="348740150" name="Notes Placeholder 2"/>
           <p:cNvSpPr>
             <a:spLocks noGrp="1"/>
           </p:cNvSpPr>
@@ -975,7 +975,7 @@
       </p:sp>
       <p:sp>
         <p:nvSpPr>
-          <p:cNvPr id="1747388916" name="Slide Number Placeholder 3"/>
+          <p:cNvPr id="182933222" name="Slide Number Placeholder 3"/>
           <p:cNvSpPr>
             <a:spLocks noGrp="1"/>
           </p:cNvSpPr>
@@ -1026,7 +1026,7 @@
       </p:grpSpPr>
       <p:sp>
         <p:nvSpPr>
-          <p:cNvPr id="2068154854" name="Title 1"/>
+          <p:cNvPr id="662518842" name="Title 1"/>
           <p:cNvSpPr>
             <a:spLocks noGrp="1"/>
           </p:cNvSpPr>
@@ -1061,7 +1061,7 @@
       </p:sp>
       <p:sp>
         <p:nvSpPr>
-          <p:cNvPr id="203675765" name="Subtitle 2"/>
+          <p:cNvPr id="578663118" name="Subtitle 2"/>
           <p:cNvSpPr>
             <a:spLocks noGrp="1"/>
           </p:cNvSpPr>
@@ -1129,7 +1129,7 @@
       </p:sp>
       <p:sp>
         <p:nvSpPr>
-          <p:cNvPr id="1402187170" name="Date Placeholder 3"/>
+          <p:cNvPr id="298759187" name="Date Placeholder 3"/>
           <p:cNvSpPr>
             <a:spLocks noGrp="1"/>
           </p:cNvSpPr>
@@ -1155,7 +1155,7 @@
       </p:sp>
       <p:sp>
         <p:nvSpPr>
-          <p:cNvPr id="754096003" name="Footer Placeholder 4"/>
+          <p:cNvPr id="170090223" name="Footer Placeholder 4"/>
           <p:cNvSpPr>
             <a:spLocks noGrp="1"/>
           </p:cNvSpPr>
@@ -1177,7 +1177,7 @@
       </p:sp>
       <p:sp>
         <p:nvSpPr>
-          <p:cNvPr id="225722854" name="Slide Number Placeholder 5"/>
+          <p:cNvPr id="1874994003" name="Slide Number Placeholder 5"/>
           <p:cNvSpPr>
             <a:spLocks noGrp="1"/>
           </p:cNvSpPr>
@@ -1228,7 +1228,7 @@
       </p:grpSpPr>
       <p:sp>
         <p:nvSpPr>
-          <p:cNvPr id="248615299" name="Title 1"/>
+          <p:cNvPr id="1083972833" name="Title 1"/>
           <p:cNvSpPr>
             <a:spLocks noGrp="1"/>
           </p:cNvSpPr>
@@ -1254,7 +1254,7 @@
       </p:sp>
       <p:sp>
         <p:nvSpPr>
-          <p:cNvPr id="1925337445" name="Vertical Text Placeholder 2"/>
+          <p:cNvPr id="616860895" name="Vertical Text Placeholder 2"/>
           <p:cNvSpPr>
             <a:spLocks noGrp="1"/>
           </p:cNvSpPr>
@@ -1320,7 +1320,7 @@
       </p:sp>
       <p:sp>
         <p:nvSpPr>
-          <p:cNvPr id="1450208911" name="Date Placeholder 3"/>
+          <p:cNvPr id="1824125471" name="Date Placeholder 3"/>
           <p:cNvSpPr>
             <a:spLocks noGrp="1"/>
           </p:cNvSpPr>
@@ -1346,7 +1346,7 @@
       </p:sp>
       <p:sp>
         <p:nvSpPr>
-          <p:cNvPr id="1654468419" name="Footer Placeholder 4"/>
+          <p:cNvPr id="2104536699" name="Footer Placeholder 4"/>
           <p:cNvSpPr>
             <a:spLocks noGrp="1"/>
           </p:cNvSpPr>
@@ -1368,7 +1368,7 @@
       </p:sp>
       <p:sp>
         <p:nvSpPr>
-          <p:cNvPr id="978805470" name="Slide Number Placeholder 5"/>
+          <p:cNvPr id="1714290830" name="Slide Number Placeholder 5"/>
           <p:cNvSpPr>
             <a:spLocks noGrp="1"/>
           </p:cNvSpPr>
@@ -1419,7 +1419,7 @@
       </p:grpSpPr>
       <p:sp>
         <p:nvSpPr>
-          <p:cNvPr id="323384973" name="Vertical Title 1"/>
+          <p:cNvPr id="53714928" name="Vertical Title 1"/>
           <p:cNvSpPr>
             <a:spLocks noGrp="1"/>
           </p:cNvSpPr>
@@ -1450,7 +1450,7 @@
       </p:sp>
       <p:sp>
         <p:nvSpPr>
-          <p:cNvPr id="1941849354" name="Vertical Text Placeholder 2"/>
+          <p:cNvPr id="171313003" name="Vertical Text Placeholder 2"/>
           <p:cNvSpPr>
             <a:spLocks noGrp="1"/>
           </p:cNvSpPr>
@@ -1521,7 +1521,7 @@
       </p:sp>
       <p:sp>
         <p:nvSpPr>
-          <p:cNvPr id="970656049" name="Date Placeholder 3"/>
+          <p:cNvPr id="1162582717" name="Date Placeholder 3"/>
           <p:cNvSpPr>
             <a:spLocks noGrp="1"/>
           </p:cNvSpPr>
@@ -1547,7 +1547,7 @@
       </p:sp>
       <p:sp>
         <p:nvSpPr>
-          <p:cNvPr id="392704597" name="Footer Placeholder 4"/>
+          <p:cNvPr id="1951143508" name="Footer Placeholder 4"/>
           <p:cNvSpPr>
             <a:spLocks noGrp="1"/>
           </p:cNvSpPr>
@@ -1569,7 +1569,7 @@
       </p:sp>
       <p:sp>
         <p:nvSpPr>
-          <p:cNvPr id="1175452257" name="Slide Number Placeholder 5"/>
+          <p:cNvPr id="468131934" name="Slide Number Placeholder 5"/>
           <p:cNvSpPr>
             <a:spLocks noGrp="1"/>
           </p:cNvSpPr>
@@ -1620,7 +1620,7 @@
       </p:grpSpPr>
       <p:sp>
         <p:nvSpPr>
-          <p:cNvPr id="1039821622" name="Title 1"/>
+          <p:cNvPr id="1889139287" name="Title 1"/>
           <p:cNvSpPr>
             <a:spLocks noGrp="1"/>
           </p:cNvSpPr>
@@ -1646,7 +1646,7 @@
       </p:sp>
       <p:sp>
         <p:nvSpPr>
-          <p:cNvPr id="1758043418" name="Content Placeholder 2"/>
+          <p:cNvPr id="262106902" name="Content Placeholder 2"/>
           <p:cNvSpPr>
             <a:spLocks noGrp="1"/>
           </p:cNvSpPr>
@@ -1712,7 +1712,7 @@
       </p:sp>
       <p:sp>
         <p:nvSpPr>
-          <p:cNvPr id="875711322" name="Date Placeholder 3"/>
+          <p:cNvPr id="1311569609" name="Date Placeholder 3"/>
           <p:cNvSpPr>
             <a:spLocks noGrp="1"/>
           </p:cNvSpPr>
@@ -1738,7 +1738,7 @@
       </p:sp>
       <p:sp>
         <p:nvSpPr>
-          <p:cNvPr id="2137112020" name="Footer Placeholder 4"/>
+          <p:cNvPr id="795584768" name="Footer Placeholder 4"/>
           <p:cNvSpPr>
             <a:spLocks noGrp="1"/>
           </p:cNvSpPr>
@@ -1760,7 +1760,7 @@
       </p:sp>
       <p:sp>
         <p:nvSpPr>
-          <p:cNvPr id="2078804415" name="Slide Number Placeholder 5"/>
+          <p:cNvPr id="359614546" name="Slide Number Placeholder 5"/>
           <p:cNvSpPr>
             <a:spLocks noGrp="1"/>
           </p:cNvSpPr>
@@ -1811,7 +1811,7 @@
       </p:grpSpPr>
       <p:sp>
         <p:nvSpPr>
-          <p:cNvPr id="1176562998" name="Title 1"/>
+          <p:cNvPr id="2082509847" name="Title 1"/>
           <p:cNvSpPr>
             <a:spLocks noGrp="1"/>
           </p:cNvSpPr>
@@ -1846,7 +1846,7 @@
       </p:sp>
       <p:sp>
         <p:nvSpPr>
-          <p:cNvPr id="1936091304" name="Text Placeholder 2"/>
+          <p:cNvPr id="1380762315" name="Text Placeholder 2"/>
           <p:cNvSpPr>
             <a:spLocks noGrp="1"/>
           </p:cNvSpPr>
@@ -1968,7 +1968,7 @@
       </p:sp>
       <p:sp>
         <p:nvSpPr>
-          <p:cNvPr id="456071655" name="Date Placeholder 3"/>
+          <p:cNvPr id="115295460" name="Date Placeholder 3"/>
           <p:cNvSpPr>
             <a:spLocks noGrp="1"/>
           </p:cNvSpPr>
@@ -1994,7 +1994,7 @@
       </p:sp>
       <p:sp>
         <p:nvSpPr>
-          <p:cNvPr id="39266233" name="Footer Placeholder 4"/>
+          <p:cNvPr id="107487191" name="Footer Placeholder 4"/>
           <p:cNvSpPr>
             <a:spLocks noGrp="1"/>
           </p:cNvSpPr>
@@ -2016,7 +2016,7 @@
       </p:sp>
       <p:sp>
         <p:nvSpPr>
-          <p:cNvPr id="818767804" name="Slide Number Placeholder 5"/>
+          <p:cNvPr id="1548366341" name="Slide Number Placeholder 5"/>
           <p:cNvSpPr>
             <a:spLocks noGrp="1"/>
           </p:cNvSpPr>
@@ -2067,7 +2067,7 @@
       </p:grpSpPr>
       <p:sp>
         <p:nvSpPr>
-          <p:cNvPr id="798077684" name="Title 1"/>
+          <p:cNvPr id="1347682262" name="Title 1"/>
           <p:cNvSpPr>
             <a:spLocks noGrp="1"/>
           </p:cNvSpPr>
@@ -2093,7 +2093,7 @@
       </p:sp>
       <p:sp>
         <p:nvSpPr>
-          <p:cNvPr id="1642899498" name="Content Placeholder 2"/>
+          <p:cNvPr id="1335494902" name="Content Placeholder 2"/>
           <p:cNvSpPr>
             <a:spLocks noGrp="1"/>
           </p:cNvSpPr>
@@ -2164,7 +2164,7 @@
       </p:sp>
       <p:sp>
         <p:nvSpPr>
-          <p:cNvPr id="2073366835" name="Content Placeholder 3"/>
+          <p:cNvPr id="440756030" name="Content Placeholder 3"/>
           <p:cNvSpPr>
             <a:spLocks noGrp="1"/>
           </p:cNvSpPr>
@@ -2235,7 +2235,7 @@
       </p:sp>
       <p:sp>
         <p:nvSpPr>
-          <p:cNvPr id="422358582" name="Date Placeholder 4"/>
+          <p:cNvPr id="1935075941" name="Date Placeholder 4"/>
           <p:cNvSpPr>
             <a:spLocks noGrp="1"/>
           </p:cNvSpPr>
@@ -2261,7 +2261,7 @@
       </p:sp>
       <p:sp>
         <p:nvSpPr>
-          <p:cNvPr id="962771625" name="Footer Placeholder 5"/>
+          <p:cNvPr id="865891542" name="Footer Placeholder 5"/>
           <p:cNvSpPr>
             <a:spLocks noGrp="1"/>
           </p:cNvSpPr>
@@ -2283,7 +2283,7 @@
       </p:sp>
       <p:sp>
         <p:nvSpPr>
-          <p:cNvPr id="492110786" name="Slide Number Placeholder 6"/>
+          <p:cNvPr id="329721144" name="Slide Number Placeholder 6"/>
           <p:cNvSpPr>
             <a:spLocks noGrp="1"/>
           </p:cNvSpPr>
@@ -2334,7 +2334,7 @@
       </p:grpSpPr>
       <p:sp>
         <p:nvSpPr>
-          <p:cNvPr id="573405396" name="Title 1"/>
+          <p:cNvPr id="1101412454" name="Title 1"/>
           <p:cNvSpPr>
             <a:spLocks noGrp="1"/>
           </p:cNvSpPr>
@@ -2365,7 +2365,7 @@
       </p:sp>
       <p:sp>
         <p:nvSpPr>
-          <p:cNvPr id="1609685396" name="Text Placeholder 2"/>
+          <p:cNvPr id="341108947" name="Text Placeholder 2"/>
           <p:cNvSpPr>
             <a:spLocks noGrp="1"/>
           </p:cNvSpPr>
@@ -2433,7 +2433,7 @@
       </p:sp>
       <p:sp>
         <p:nvSpPr>
-          <p:cNvPr id="757885951" name="Content Placeholder 3"/>
+          <p:cNvPr id="427331699" name="Content Placeholder 3"/>
           <p:cNvSpPr>
             <a:spLocks noGrp="1"/>
           </p:cNvSpPr>
@@ -2504,7 +2504,7 @@
       </p:sp>
       <p:sp>
         <p:nvSpPr>
-          <p:cNvPr id="1681900689" name="Text Placeholder 4"/>
+          <p:cNvPr id="1844541667" name="Text Placeholder 4"/>
           <p:cNvSpPr>
             <a:spLocks noGrp="1"/>
           </p:cNvSpPr>
@@ -2572,7 +2572,7 @@
       </p:sp>
       <p:sp>
         <p:nvSpPr>
-          <p:cNvPr id="1703454939" name="Content Placeholder 5"/>
+          <p:cNvPr id="2129408548" name="Content Placeholder 5"/>
           <p:cNvSpPr>
             <a:spLocks noGrp="1"/>
           </p:cNvSpPr>
@@ -2643,7 +2643,7 @@
       </p:sp>
       <p:sp>
         <p:nvSpPr>
-          <p:cNvPr id="1127594184" name="Date Placeholder 6"/>
+          <p:cNvPr id="1205631653" name="Date Placeholder 6"/>
           <p:cNvSpPr>
             <a:spLocks noGrp="1"/>
           </p:cNvSpPr>
@@ -2669,7 +2669,7 @@
       </p:sp>
       <p:sp>
         <p:nvSpPr>
-          <p:cNvPr id="1215969607" name="Footer Placeholder 7"/>
+          <p:cNvPr id="1291982349" name="Footer Placeholder 7"/>
           <p:cNvSpPr>
             <a:spLocks noGrp="1"/>
           </p:cNvSpPr>
@@ -2691,7 +2691,7 @@
       </p:sp>
       <p:sp>
         <p:nvSpPr>
-          <p:cNvPr id="1701172092" name="Slide Number Placeholder 8"/>
+          <p:cNvPr id="1434290564" name="Slide Number Placeholder 8"/>
           <p:cNvSpPr>
             <a:spLocks noGrp="1"/>
           </p:cNvSpPr>
@@ -2742,7 +2742,7 @@
       </p:grpSpPr>
       <p:sp>
         <p:nvSpPr>
-          <p:cNvPr id="868294334" name="Title 1"/>
+          <p:cNvPr id="479322226" name="Title 1"/>
           <p:cNvSpPr>
             <a:spLocks noGrp="1"/>
           </p:cNvSpPr>
@@ -2768,7 +2768,7 @@
       </p:sp>
       <p:sp>
         <p:nvSpPr>
-          <p:cNvPr id="1583801634" name="Date Placeholder 2"/>
+          <p:cNvPr id="1376412747" name="Date Placeholder 2"/>
           <p:cNvSpPr>
             <a:spLocks noGrp="1"/>
           </p:cNvSpPr>
@@ -2794,7 +2794,7 @@
       </p:sp>
       <p:sp>
         <p:nvSpPr>
-          <p:cNvPr id="1913512728" name="Footer Placeholder 3"/>
+          <p:cNvPr id="500593799" name="Footer Placeholder 3"/>
           <p:cNvSpPr>
             <a:spLocks noGrp="1"/>
           </p:cNvSpPr>
@@ -2816,7 +2816,7 @@
       </p:sp>
       <p:sp>
         <p:nvSpPr>
-          <p:cNvPr id="700705045" name="Slide Number Placeholder 4"/>
+          <p:cNvPr id="948914093" name="Slide Number Placeholder 4"/>
           <p:cNvSpPr>
             <a:spLocks noGrp="1"/>
           </p:cNvSpPr>
@@ -2867,7 +2867,7 @@
       </p:grpSpPr>
       <p:sp>
         <p:nvSpPr>
-          <p:cNvPr id="312281701" name="Date Placeholder 1"/>
+          <p:cNvPr id="511607753" name="Date Placeholder 1"/>
           <p:cNvSpPr>
             <a:spLocks noGrp="1"/>
           </p:cNvSpPr>
@@ -2893,7 +2893,7 @@
       </p:sp>
       <p:sp>
         <p:nvSpPr>
-          <p:cNvPr id="2020881803" name="Footer Placeholder 2"/>
+          <p:cNvPr id="99989384" name="Footer Placeholder 2"/>
           <p:cNvSpPr>
             <a:spLocks noGrp="1"/>
           </p:cNvSpPr>
@@ -2915,7 +2915,7 @@
       </p:sp>
       <p:sp>
         <p:nvSpPr>
-          <p:cNvPr id="1334416868" name="Slide Number Placeholder 3"/>
+          <p:cNvPr id="465321337" name="Slide Number Placeholder 3"/>
           <p:cNvSpPr>
             <a:spLocks noGrp="1"/>
           </p:cNvSpPr>
@@ -2966,7 +2966,7 @@
       </p:grpSpPr>
       <p:sp>
         <p:nvSpPr>
-          <p:cNvPr id="732467201" name="Title 1"/>
+          <p:cNvPr id="1278310584" name="Title 1"/>
           <p:cNvSpPr>
             <a:spLocks noGrp="1"/>
           </p:cNvSpPr>
@@ -3001,7 +3001,7 @@
       </p:sp>
       <p:sp>
         <p:nvSpPr>
-          <p:cNvPr id="1534055741" name="Content Placeholder 2"/>
+          <p:cNvPr id="1867519300" name="Content Placeholder 2"/>
           <p:cNvSpPr>
             <a:spLocks noGrp="1"/>
           </p:cNvSpPr>
@@ -3100,7 +3100,7 @@
       </p:sp>
       <p:sp>
         <p:nvSpPr>
-          <p:cNvPr id="770202485" name="Text Placeholder 3"/>
+          <p:cNvPr id="1769841143" name="Text Placeholder 3"/>
           <p:cNvSpPr>
             <a:spLocks noGrp="1"/>
           </p:cNvSpPr>
@@ -3168,7 +3168,7 @@
       </p:sp>
       <p:sp>
         <p:nvSpPr>
-          <p:cNvPr id="2007633898" name="Date Placeholder 4"/>
+          <p:cNvPr id="1287454077" name="Date Placeholder 4"/>
           <p:cNvSpPr>
             <a:spLocks noGrp="1"/>
           </p:cNvSpPr>
@@ -3194,7 +3194,7 @@
       </p:sp>
       <p:sp>
         <p:nvSpPr>
-          <p:cNvPr id="1489305069" name="Footer Placeholder 5"/>
+          <p:cNvPr id="1959533554" name="Footer Placeholder 5"/>
           <p:cNvSpPr>
             <a:spLocks noGrp="1"/>
           </p:cNvSpPr>
@@ -3216,7 +3216,7 @@
       </p:sp>
       <p:sp>
         <p:nvSpPr>
-          <p:cNvPr id="1758507528" name="Slide Number Placeholder 6"/>
+          <p:cNvPr id="1590224383" name="Slide Number Placeholder 6"/>
           <p:cNvSpPr>
             <a:spLocks noGrp="1"/>
           </p:cNvSpPr>
@@ -3267,7 +3267,7 @@
       </p:grpSpPr>
       <p:sp>
         <p:nvSpPr>
-          <p:cNvPr id="862826730" name="Title 1"/>
+          <p:cNvPr id="1051089583" name="Title 1"/>
           <p:cNvSpPr>
             <a:spLocks noGrp="1"/>
           </p:cNvSpPr>
@@ -3302,7 +3302,7 @@
       </p:sp>
       <p:sp>
         <p:nvSpPr>
-          <p:cNvPr id="679120630" name="Picture Placeholder 2"/>
+          <p:cNvPr id="1152370299" name="Picture Placeholder 2"/>
           <p:cNvSpPr>
             <a:spLocks noChangeAspect="1" noGrp="1"/>
           </p:cNvSpPr>
@@ -3370,7 +3370,7 @@
       </p:sp>
       <p:sp>
         <p:nvSpPr>
-          <p:cNvPr id="26797985" name="Text Placeholder 3"/>
+          <p:cNvPr id="392507562" name="Text Placeholder 3"/>
           <p:cNvSpPr>
             <a:spLocks noGrp="1"/>
           </p:cNvSpPr>
@@ -3438,7 +3438,7 @@
       </p:sp>
       <p:sp>
         <p:nvSpPr>
-          <p:cNvPr id="707541700" name="Date Placeholder 4"/>
+          <p:cNvPr id="1542746910" name="Date Placeholder 4"/>
           <p:cNvSpPr>
             <a:spLocks noGrp="1"/>
           </p:cNvSpPr>
@@ -3464,7 +3464,7 @@
       </p:sp>
       <p:sp>
         <p:nvSpPr>
-          <p:cNvPr id="891029956" name="Footer Placeholder 5"/>
+          <p:cNvPr id="713373521" name="Footer Placeholder 5"/>
           <p:cNvSpPr>
             <a:spLocks noGrp="1"/>
           </p:cNvSpPr>
@@ -3486,7 +3486,7 @@
       </p:sp>
       <p:sp>
         <p:nvSpPr>
-          <p:cNvPr id="222783195" name="Slide Number Placeholder 6"/>
+          <p:cNvPr id="678628730" name="Slide Number Placeholder 6"/>
           <p:cNvSpPr>
             <a:spLocks noGrp="1"/>
           </p:cNvSpPr>
@@ -3542,7 +3542,7 @@
       </p:grpSpPr>
       <p:sp>
         <p:nvSpPr>
-          <p:cNvPr id="1044287426" name="Title Placeholder 1"/>
+          <p:cNvPr id="1311957645" name="Title Placeholder 1"/>
           <p:cNvSpPr>
             <a:spLocks noGrp="1"/>
           </p:cNvSpPr>
@@ -3578,7 +3578,7 @@
       </p:sp>
       <p:sp>
         <p:nvSpPr>
-          <p:cNvPr id="844585466" name="Text Placeholder 2"/>
+          <p:cNvPr id="222142715" name="Text Placeholder 2"/>
           <p:cNvSpPr>
             <a:spLocks noGrp="1"/>
           </p:cNvSpPr>
@@ -3654,7 +3654,7 @@
       </p:sp>
       <p:sp>
         <p:nvSpPr>
-          <p:cNvPr id="1852810653" name="Date Placeholder 3"/>
+          <p:cNvPr id="11081865" name="Date Placeholder 3"/>
           <p:cNvSpPr>
             <a:spLocks noGrp="1"/>
           </p:cNvSpPr>
@@ -3698,7 +3698,7 @@
       </p:sp>
       <p:sp>
         <p:nvSpPr>
-          <p:cNvPr id="2084540673" name="Footer Placeholder 4"/>
+          <p:cNvPr id="1329814070" name="Footer Placeholder 4"/>
           <p:cNvSpPr>
             <a:spLocks noGrp="1"/>
           </p:cNvSpPr>
@@ -3738,7 +3738,7 @@
       </p:sp>
       <p:sp>
         <p:nvSpPr>
-          <p:cNvPr id="661497626" name="Slide Number Placeholder 5"/>
+          <p:cNvPr id="528561186" name="Slide Number Placeholder 5"/>
           <p:cNvSpPr>
             <a:spLocks noGrp="1"/>
           </p:cNvSpPr>
@@ -4085,7 +4085,9 @@
     <p:bg>
       <p:bgPr shadeToTitle="0">
         <a:solidFill>
-          <a:srgbClr val="57AF5A"/>
+          <a:srgbClr val="57AF5A">
+            <a:alpha val="99999"/>
+          </a:srgbClr>
         </a:solidFill>
       </p:bgPr>
     </p:bg>
@@ -4105,7 +4107,7 @@
       </p:grpSpPr>
       <p:grpSp>
         <p:nvGrpSpPr>
-          <p:cNvPr id="216546626" name=""/>
+          <p:cNvPr id="69584195" name=""/>
           <p:cNvGrpSpPr/>
           <p:nvPr/>
         </p:nvGrpSpPr>
@@ -4134,9 +4136,20 @@
               </a:avLst>
             </a:prstGeom>
             <a:solidFill>
-              <a:schemeClr val="bg1"/>
+              <a:schemeClr val="bg1">
+                <a:alpha val="99999"/>
+              </a:schemeClr>
             </a:solidFill>
-            <a:ln/>
+            <a:ln w="12700" cap="flat" cmpd="sng" algn="ctr">
+              <a:solidFill>
+                <a:schemeClr val="bg1">
+                  <a:lumMod val="74901"/>
+                  <a:alpha val="99999"/>
+                </a:schemeClr>
+              </a:solidFill>
+              <a:prstDash val="solid"/>
+              <a:miter lim="800000"/>
+            </a:ln>
             <a:effectLst>
               <a:outerShdw blurRad="50800" dist="203200" dir="8100000" sx="100000" sy="100000" algn="tr" rotWithShape="0">
                 <a:prstClr val="black">
@@ -4177,13 +4190,16 @@
               <a:avLst/>
             </a:prstGeom>
             <a:solidFill>
-              <a:schemeClr val="bg1"/>
+              <a:schemeClr val="bg1">
+                <a:alpha val="6000"/>
+              </a:schemeClr>
             </a:solidFill>
             <a:ln w="12700" cap="flat" cmpd="sng" algn="ctr">
               <a:solidFill>
                 <a:schemeClr val="tx1">
                   <a:lumMod val="50196"/>
                   <a:lumOff val="49804"/>
+                  <a:alpha val="99999"/>
                 </a:schemeClr>
               </a:solidFill>
               <a:prstDash val="solid"/>
@@ -4245,13 +4261,16 @@
               <a:avLst/>
             </a:prstGeom>
             <a:solidFill>
-              <a:schemeClr val="bg1"/>
+              <a:schemeClr val="bg1">
+                <a:alpha val="6000"/>
+              </a:schemeClr>
             </a:solidFill>
             <a:ln w="12700" cap="flat" cmpd="sng" algn="ctr">
               <a:solidFill>
                 <a:schemeClr val="tx1">
                   <a:lumMod val="50196"/>
                   <a:lumOff val="49804"/>
+                  <a:alpha val="99999"/>
                 </a:schemeClr>
               </a:solidFill>
               <a:prstDash val="solid"/>
@@ -4311,13 +4330,16 @@
               <a:avLst/>
             </a:prstGeom>
             <a:solidFill>
-              <a:schemeClr val="bg1"/>
+              <a:schemeClr val="bg1">
+                <a:alpha val="6000"/>
+              </a:schemeClr>
             </a:solidFill>
             <a:ln w="12700" cap="flat" cmpd="sng" algn="ctr">
               <a:solidFill>
                 <a:schemeClr val="tx1">
                   <a:lumMod val="50196"/>
                   <a:lumOff val="49804"/>
+                  <a:alpha val="99999"/>
                 </a:schemeClr>
               </a:solidFill>
               <a:prstDash val="solid"/>
@@ -4379,13 +4401,16 @@
               <a:avLst/>
             </a:prstGeom>
             <a:solidFill>
-              <a:schemeClr val="bg1"/>
+              <a:schemeClr val="bg1">
+                <a:alpha val="6000"/>
+              </a:schemeClr>
             </a:solidFill>
             <a:ln w="12700" cap="flat" cmpd="sng" algn="ctr">
               <a:solidFill>
                 <a:schemeClr val="tx1">
                   <a:lumMod val="50196"/>
                   <a:lumOff val="49804"/>
+                  <a:alpha val="99999"/>
                 </a:schemeClr>
               </a:solidFill>
               <a:prstDash val="solid"/>
@@ -4458,13 +4483,16 @@
               <a:avLst/>
             </a:prstGeom>
             <a:solidFill>
-              <a:schemeClr val="bg1"/>
+              <a:schemeClr val="bg1">
+                <a:alpha val="6000"/>
+              </a:schemeClr>
             </a:solidFill>
             <a:ln w="12700" cap="flat" cmpd="sng" algn="ctr">
               <a:solidFill>
                 <a:schemeClr val="tx1">
                   <a:lumMod val="50196"/>
                   <a:lumOff val="49804"/>
+                  <a:alpha val="99999"/>
                 </a:schemeClr>
               </a:solidFill>
               <a:prstDash val="solid"/>
@@ -4514,7 +4542,7 @@
       </p:grpSp>
       <p:sp>
         <p:nvSpPr>
-          <p:cNvPr id="978580149" name="Subtitle 2"/>
+          <p:cNvPr id="1422211877" name="Subtitle 2"/>
           <p:cNvSpPr>
             <a:spLocks noGrp="1"/>
           </p:cNvSpPr>
@@ -4545,7 +4573,7 @@
       </p:sp>
       <p:pic>
         <p:nvPicPr>
-          <p:cNvPr id="395702974" name=""/>
+          <p:cNvPr id="1824808063" name=""/>
           <p:cNvPicPr>
             <a:picLocks noChangeAspect="1"/>
           </p:cNvPicPr>
@@ -4563,6 +4591,13 @@
           <a:prstGeom prst="rect">
             <a:avLst/>
           </a:prstGeom>
+          <a:ln w="12700">
+            <a:solidFill>
+              <a:srgbClr val="000000">
+                <a:alpha val="0"/>
+              </a:srgbClr>
+            </a:solidFill>
+          </a:ln>
         </p:spPr>
       </p:pic>
     </p:spTree>
@@ -4609,7 +4644,7 @@
       </p:grpSpPr>
       <p:grpSp>
         <p:nvGrpSpPr>
-          <p:cNvPr id="765957511" name=""/>
+          <p:cNvPr id="411138576" name=""/>
           <p:cNvGrpSpPr/>
           <p:nvPr/>
         </p:nvGrpSpPr>
@@ -4725,14 +4760,14 @@
       </p:grpSp>
       <p:sp>
         <p:nvSpPr>
-          <p:cNvPr id="1414422804" name=""/>
+          <p:cNvPr id="1511598521" name=""/>
           <p:cNvSpPr txBox="1"/>
           <p:nvPr/>
         </p:nvSpPr>
         <p:spPr bwMode="auto">
           <a:xfrm rot="0" flipH="0" flipV="0">
-            <a:off x="2687999" y="769189"/>
-            <a:ext cx="2464290" cy="396599"/>
+            <a:off x="2687998" y="769188"/>
+            <a:ext cx="2464650" cy="396599"/>
           </a:xfrm>
           <a:prstGeom prst="rect">
             <a:avLst/>
@@ -4748,16 +4783,24 @@
               <a:defRPr/>
             </a:pPr>
             <a:r>
-              <a:rPr lang="fr-CH" sz="2000" b="1"/>
+              <a:rPr lang="fr-CH" sz="2000" b="1">
+                <a:solidFill>
+                  <a:srgbClr val="263238"/>
+                </a:solidFill>
+              </a:rPr>
               <a:t>Current Situation</a:t>
             </a:r>
-            <a:endParaRPr sz="2000" b="1"/>
-          </a:p>
-        </p:txBody>
-      </p:sp>
-      <p:sp>
-        <p:nvSpPr>
-          <p:cNvPr id="1629988312" name=""/>
+            <a:endParaRPr sz="2000" b="1">
+              <a:solidFill>
+                <a:srgbClr val="263238"/>
+              </a:solidFill>
+            </a:endParaRPr>
+          </a:p>
+        </p:txBody>
+      </p:sp>
+      <p:sp>
+        <p:nvSpPr>
+          <p:cNvPr id="1092264708" name=""/>
           <p:cNvSpPr/>
           <p:nvPr/>
         </p:nvSpPr>
@@ -4803,7 +4846,7 @@
         <p:txBody>
           <a:bodyPr vertOverflow="overflow" horzOverflow="overflow" vert="horz" wrap="square" lIns="91440" tIns="45720" rIns="91440" bIns="45720" numCol="1" spcCol="0" rtlCol="0" fromWordArt="0" anchor="ctr" anchorCtr="0" forceAA="0" upright="0" compatLnSpc="0"/>
           <a:p>
-            <a:pPr marL="283879" indent="-283879">
+            <a:pPr marL="683928" lvl="1" indent="-283879">
               <a:lnSpc>
                 <a:spcPct val="300000"/>
               </a:lnSpc>
@@ -4832,7 +4875,7 @@
             </a:endParaRPr>
           </a:p>
           <a:p>
-            <a:pPr marL="283879" indent="-283879">
+            <a:pPr marL="683928" lvl="1" indent="-283879">
               <a:lnSpc>
                 <a:spcPct val="300000"/>
               </a:lnSpc>
@@ -4861,7 +4904,7 @@
             </a:endParaRPr>
           </a:p>
           <a:p>
-            <a:pPr marL="283879" indent="-283879">
+            <a:pPr marL="683928" lvl="1" indent="-283879">
               <a:lnSpc>
                 <a:spcPct val="300000"/>
               </a:lnSpc>
@@ -4890,7 +4933,7 @@
             </a:endParaRPr>
           </a:p>
           <a:p>
-            <a:pPr marL="283879" indent="-283879">
+            <a:pPr marL="683928" lvl="1" indent="-283879">
               <a:lnSpc>
                 <a:spcPct val="300000"/>
               </a:lnSpc>
@@ -4922,16 +4965,16 @@
       </p:sp>
       <p:grpSp>
         <p:nvGrpSpPr>
-          <p:cNvPr id="860598417" name=""/>
+          <p:cNvPr id="741642118" name=""/>
           <p:cNvGrpSpPr/>
           <p:nvPr/>
         </p:nvGrpSpPr>
         <p:grpSpPr bwMode="auto">
           <a:xfrm>
-            <a:off x="-93299" y="-133349"/>
-            <a:ext cx="2626949" cy="6976310"/>
+            <a:off x="-93298" y="-133348"/>
+            <a:ext cx="2626948" cy="6976309"/>
             <a:chOff x="0" y="0"/>
-            <a:chExt cx="2626949" cy="6976310"/>
+            <a:chExt cx="2626948" cy="6976309"/>
           </a:xfrm>
         </p:grpSpPr>
         <p:sp>
@@ -4951,6 +4994,13 @@
             <a:solidFill>
               <a:srgbClr val="263238"/>
             </a:solidFill>
+            <a:ln w="12700" cap="flat" cmpd="sng" algn="ctr">
+              <a:solidFill>
+                <a:srgbClr val="263238"/>
+              </a:solidFill>
+              <a:prstDash val="solid"/>
+              <a:miter lim="800000"/>
+            </a:ln>
           </p:spPr>
           <p:style>
             <a:lnRef idx="2">
@@ -4982,8 +5032,8 @@
             <a:stretch/>
           </p:blipFill>
           <p:spPr bwMode="auto">
-            <a:xfrm>
-              <a:off x="93299" y="133349"/>
+            <a:xfrm rot="0" flipH="0" flipV="0">
+              <a:off x="93298" y="133348"/>
               <a:ext cx="2533649" cy="676274"/>
             </a:xfrm>
             <a:prstGeom prst="rect">
@@ -4999,7 +5049,7 @@
           </p:nvSpPr>
           <p:spPr bwMode="auto">
             <a:xfrm rot="0" flipH="0" flipV="0">
-              <a:off x="93299" y="809624"/>
+              <a:off x="93298" y="809623"/>
               <a:ext cx="2533649" cy="551948"/>
             </a:xfrm>
             <a:prstGeom prst="rect">
@@ -5054,7 +5104,7 @@
           </p:nvSpPr>
           <p:spPr bwMode="auto">
             <a:xfrm rot="0" flipH="0" flipV="0">
-              <a:off x="93299" y="1361573"/>
+              <a:off x="93298" y="1361572"/>
               <a:ext cx="2533649" cy="551947"/>
             </a:xfrm>
             <a:prstGeom prst="rect">
@@ -5109,7 +5159,7 @@
           </p:nvSpPr>
           <p:spPr bwMode="auto">
             <a:xfrm rot="0" flipH="0" flipV="0">
-              <a:off x="93299" y="1913521"/>
+              <a:off x="93298" y="1913520"/>
               <a:ext cx="2533649" cy="551947"/>
             </a:xfrm>
             <a:prstGeom prst="rect">
@@ -5164,7 +5214,7 @@
           </p:nvSpPr>
           <p:spPr bwMode="auto">
             <a:xfrm rot="0" flipH="0" flipV="0">
-              <a:off x="93299" y="2465469"/>
+              <a:off x="93298" y="2465468"/>
               <a:ext cx="2533649" cy="551947"/>
             </a:xfrm>
             <a:prstGeom prst="rect">
@@ -5256,7 +5306,7 @@
       </p:grpSpPr>
       <p:grpSp>
         <p:nvGrpSpPr>
-          <p:cNvPr id="2017760926" name=""/>
+          <p:cNvPr id="1220788145" name=""/>
           <p:cNvGrpSpPr/>
           <p:nvPr/>
         </p:nvGrpSpPr>
@@ -5372,14 +5422,14 @@
       </p:grpSp>
       <p:sp>
         <p:nvSpPr>
-          <p:cNvPr id="1610573754" name=""/>
+          <p:cNvPr id="1010511417" name=""/>
           <p:cNvSpPr txBox="1"/>
           <p:nvPr/>
         </p:nvSpPr>
         <p:spPr bwMode="auto">
           <a:xfrm rot="0" flipH="0" flipV="0">
-            <a:off x="2687999" y="769189"/>
-            <a:ext cx="2472210" cy="396599"/>
+            <a:off x="2687998" y="769188"/>
+            <a:ext cx="2472570" cy="396599"/>
           </a:xfrm>
           <a:prstGeom prst="rect">
             <a:avLst/>
@@ -5395,16 +5445,24 @@
               <a:defRPr/>
             </a:pPr>
             <a:r>
-              <a:rPr lang="fr-CH" sz="2000" b="1"/>
+              <a:rPr lang="fr-CH" sz="2000" b="1">
+                <a:solidFill>
+                  <a:srgbClr val="263238"/>
+                </a:solidFill>
+              </a:rPr>
               <a:t>Our Solution</a:t>
             </a:r>
-            <a:endParaRPr sz="2000" b="1"/>
-          </a:p>
-        </p:txBody>
-      </p:sp>
-      <p:sp>
-        <p:nvSpPr>
-          <p:cNvPr id="1019519499" name=""/>
+            <a:endParaRPr sz="2000" b="1">
+              <a:solidFill>
+                <a:srgbClr val="263238"/>
+              </a:solidFill>
+            </a:endParaRPr>
+          </a:p>
+        </p:txBody>
+      </p:sp>
+      <p:sp>
+        <p:nvSpPr>
+          <p:cNvPr id="1537618660" name=""/>
           <p:cNvSpPr/>
           <p:nvPr/>
         </p:nvSpPr>
@@ -5450,25 +5508,251 @@
         <p:txBody>
           <a:bodyPr vertOverflow="overflow" horzOverflow="overflow" vert="horz" wrap="square" lIns="91440" tIns="45720" rIns="91440" bIns="45720" numCol="1" spcCol="0" rtlCol="0" fromWordArt="0" anchor="ctr" anchorCtr="0" forceAA="0" upright="0" compatLnSpc="0"/>
           <a:p>
-            <a:pPr>
-              <a:defRPr/>
-            </a:pPr>
-            <a:endParaRPr/>
+            <a:pPr marL="683929" lvl="1" indent="-283879">
+              <a:lnSpc>
+                <a:spcPct val="200000"/>
+              </a:lnSpc>
+              <a:buFont typeface="Arial"/>
+              <a:buChar char="•"/>
+              <a:defRPr/>
+            </a:pPr>
+            <a:r>
+              <a:rPr lang="fr-CH" b="1">
+                <a:solidFill>
+                  <a:schemeClr val="tx1">
+                    <a:lumMod val="75000"/>
+                    <a:lumOff val="25000"/>
+                  </a:schemeClr>
+                </a:solidFill>
+              </a:rPr>
+              <a:t>HTTPS Connection</a:t>
+            </a:r>
+            <a:endParaRPr b="1">
+              <a:solidFill>
+                <a:schemeClr val="tx1">
+                  <a:lumMod val="75000"/>
+                  <a:lumOff val="25000"/>
+                </a:schemeClr>
+              </a:solidFill>
+            </a:endParaRPr>
+          </a:p>
+          <a:p>
+            <a:pPr marL="683929" lvl="1" indent="-283879">
+              <a:lnSpc>
+                <a:spcPct val="200000"/>
+              </a:lnSpc>
+              <a:buFont typeface="Arial"/>
+              <a:buChar char="•"/>
+              <a:defRPr/>
+            </a:pPr>
+            <a:r>
+              <a:rPr lang="fr-CH" b="1">
+                <a:solidFill>
+                  <a:schemeClr val="tx1">
+                    <a:lumMod val="75000"/>
+                    <a:lumOff val="25000"/>
+                  </a:schemeClr>
+                </a:solidFill>
+              </a:rPr>
+              <a:t>At-Rest Encryption</a:t>
+            </a:r>
+            <a:endParaRPr b="1">
+              <a:solidFill>
+                <a:schemeClr val="tx1">
+                  <a:lumMod val="75000"/>
+                  <a:lumOff val="25000"/>
+                </a:schemeClr>
+              </a:solidFill>
+            </a:endParaRPr>
+          </a:p>
+          <a:p>
+            <a:pPr marL="683929" lvl="1" indent="-283879">
+              <a:lnSpc>
+                <a:spcPct val="200000"/>
+              </a:lnSpc>
+              <a:buFont typeface="Arial"/>
+              <a:buChar char="•"/>
+              <a:defRPr/>
+            </a:pPr>
+            <a:r>
+              <a:rPr lang="fr-CH" b="1">
+                <a:solidFill>
+                  <a:schemeClr val="tx1">
+                    <a:lumMod val="75000"/>
+                    <a:lumOff val="25000"/>
+                  </a:schemeClr>
+                </a:solidFill>
+              </a:rPr>
+              <a:t>Teams Management</a:t>
+            </a:r>
+            <a:endParaRPr b="1">
+              <a:solidFill>
+                <a:schemeClr val="tx1">
+                  <a:lumMod val="75000"/>
+                  <a:lumOff val="25000"/>
+                </a:schemeClr>
+              </a:solidFill>
+            </a:endParaRPr>
+          </a:p>
+          <a:p>
+            <a:pPr marL="683929" lvl="1" indent="-283879">
+              <a:lnSpc>
+                <a:spcPct val="200000"/>
+              </a:lnSpc>
+              <a:buFont typeface="Arial"/>
+              <a:buChar char="•"/>
+              <a:defRPr/>
+            </a:pPr>
+            <a:r>
+              <a:rPr lang="fr-CH" b="1">
+                <a:solidFill>
+                  <a:schemeClr val="tx1">
+                    <a:lumMod val="75000"/>
+                    <a:lumOff val="25000"/>
+                  </a:schemeClr>
+                </a:solidFill>
+              </a:rPr>
+              <a:t>Authentication:</a:t>
+            </a:r>
+            <a:endParaRPr b="1">
+              <a:solidFill>
+                <a:schemeClr val="tx1">
+                  <a:lumMod val="75000"/>
+                  <a:lumOff val="25000"/>
+                </a:schemeClr>
+              </a:solidFill>
+            </a:endParaRPr>
+          </a:p>
+          <a:p>
+            <a:pPr marL="1083979" lvl="2" indent="-283879">
+              <a:lnSpc>
+                <a:spcPct val="200000"/>
+              </a:lnSpc>
+              <a:buFont typeface="Arial"/>
+              <a:buChar char="•"/>
+              <a:defRPr/>
+            </a:pPr>
+            <a:r>
+              <a:rPr lang="fr-CH" b="1">
+                <a:solidFill>
+                  <a:schemeClr val="tx1">
+                    <a:lumMod val="75000"/>
+                    <a:lumOff val="25000"/>
+                  </a:schemeClr>
+                </a:solidFill>
+              </a:rPr>
+              <a:t>Bearer Tokens (Mainly for frontend)</a:t>
+            </a:r>
+            <a:endParaRPr b="1">
+              <a:solidFill>
+                <a:schemeClr val="tx1">
+                  <a:lumMod val="75000"/>
+                  <a:lumOff val="25000"/>
+                </a:schemeClr>
+              </a:solidFill>
+            </a:endParaRPr>
+          </a:p>
+          <a:p>
+            <a:pPr marL="1083979" lvl="2" indent="-283879">
+              <a:lnSpc>
+                <a:spcPct val="200000"/>
+              </a:lnSpc>
+              <a:buFont typeface="Arial"/>
+              <a:buChar char="•"/>
+              <a:defRPr/>
+            </a:pPr>
+            <a:r>
+              <a:rPr lang="fr-CH" b="1">
+                <a:solidFill>
+                  <a:schemeClr val="tx1">
+                    <a:lumMod val="75000"/>
+                    <a:lumOff val="25000"/>
+                  </a:schemeClr>
+                </a:solidFill>
+              </a:rPr>
+              <a:t>Basic HTTP Authentication (Mainly for Terraform)</a:t>
+            </a:r>
+            <a:endParaRPr b="1">
+              <a:solidFill>
+                <a:schemeClr val="tx1">
+                  <a:lumMod val="75000"/>
+                  <a:lumOff val="25000"/>
+                </a:schemeClr>
+              </a:solidFill>
+            </a:endParaRPr>
+          </a:p>
+          <a:p>
+            <a:pPr marL="683929" lvl="1" indent="-283879">
+              <a:lnSpc>
+                <a:spcPct val="200000"/>
+              </a:lnSpc>
+              <a:buFont typeface="Arial"/>
+              <a:buChar char="•"/>
+              <a:defRPr/>
+            </a:pPr>
+            <a:r>
+              <a:rPr lang="fr-CH" b="1">
+                <a:solidFill>
+                  <a:schemeClr val="tx1">
+                    <a:lumMod val="75000"/>
+                    <a:lumOff val="25000"/>
+                  </a:schemeClr>
+                </a:solidFill>
+              </a:rPr>
+              <a:t>Authorization Management (roles, privileges)</a:t>
+            </a:r>
+            <a:endParaRPr b="1">
+              <a:solidFill>
+                <a:schemeClr val="tx1">
+                  <a:lumMod val="75000"/>
+                  <a:lumOff val="25000"/>
+                </a:schemeClr>
+              </a:solidFill>
+            </a:endParaRPr>
+          </a:p>
+          <a:p>
+            <a:pPr marL="683929" lvl="1" indent="-283879">
+              <a:lnSpc>
+                <a:spcPct val="200000"/>
+              </a:lnSpc>
+              <a:buFont typeface="Arial"/>
+              <a:buChar char="•"/>
+              <a:defRPr/>
+            </a:pPr>
+            <a:r>
+              <a:rPr lang="fr-CH" b="1">
+                <a:solidFill>
+                  <a:schemeClr val="tx1">
+                    <a:lumMod val="75000"/>
+                    <a:lumOff val="25000"/>
+                  </a:schemeClr>
+                </a:solidFill>
+              </a:rPr>
+              <a:t>Possibility to LOCK / UNLOCK States</a:t>
+            </a:r>
+            <a:endParaRPr b="1">
+              <a:solidFill>
+                <a:schemeClr val="tx1">
+                  <a:lumMod val="75000"/>
+                  <a:lumOff val="25000"/>
+                </a:schemeClr>
+              </a:solidFill>
+            </a:endParaRPr>
           </a:p>
         </p:txBody>
       </p:sp>
       <p:grpSp>
         <p:nvGrpSpPr>
-          <p:cNvPr id="2020554007" name=""/>
+          <p:cNvPr id="1550785773" name=""/>
           <p:cNvGrpSpPr/>
           <p:nvPr/>
         </p:nvGrpSpPr>
         <p:grpSpPr bwMode="auto">
           <a:xfrm>
-            <a:off x="-93299" y="-133349"/>
-            <a:ext cx="2626949" cy="6976310"/>
+            <a:off x="-93298" y="-133348"/>
+            <a:ext cx="2626948" cy="6976309"/>
             <a:chOff x="0" y="0"/>
-            <a:chExt cx="2626949" cy="6976310"/>
+            <a:chExt cx="2626948" cy="6976309"/>
           </a:xfrm>
         </p:grpSpPr>
         <p:sp>
@@ -5488,6 +5772,13 @@
             <a:solidFill>
               <a:srgbClr val="263238"/>
             </a:solidFill>
+            <a:ln w="12700" cap="flat" cmpd="sng" algn="ctr">
+              <a:solidFill>
+                <a:srgbClr val="263238"/>
+              </a:solidFill>
+              <a:prstDash val="solid"/>
+              <a:miter lim="800000"/>
+            </a:ln>
           </p:spPr>
           <p:style>
             <a:lnRef idx="2">
@@ -5519,8 +5810,8 @@
             <a:stretch/>
           </p:blipFill>
           <p:spPr bwMode="auto">
-            <a:xfrm>
-              <a:off x="93299" y="133349"/>
+            <a:xfrm rot="0" flipH="0" flipV="0">
+              <a:off x="93298" y="133348"/>
               <a:ext cx="2533649" cy="676274"/>
             </a:xfrm>
             <a:prstGeom prst="rect">
@@ -5536,7 +5827,7 @@
           </p:nvSpPr>
           <p:spPr bwMode="auto">
             <a:xfrm rot="0" flipH="0" flipV="0">
-              <a:off x="93299" y="809624"/>
+              <a:off x="93298" y="809623"/>
               <a:ext cx="2533649" cy="551948"/>
             </a:xfrm>
             <a:prstGeom prst="rect">
@@ -5591,7 +5882,7 @@
           </p:nvSpPr>
           <p:spPr bwMode="auto">
             <a:xfrm rot="0" flipH="0" flipV="0">
-              <a:off x="93299" y="1361573"/>
+              <a:off x="93298" y="1361572"/>
               <a:ext cx="2533649" cy="551947"/>
             </a:xfrm>
             <a:prstGeom prst="rect">
@@ -5646,7 +5937,7 @@
           </p:nvSpPr>
           <p:spPr bwMode="auto">
             <a:xfrm rot="0" flipH="0" flipV="0">
-              <a:off x="93299" y="1913521"/>
+              <a:off x="93298" y="1913520"/>
               <a:ext cx="2533649" cy="551947"/>
             </a:xfrm>
             <a:prstGeom prst="rect">
@@ -5701,7 +5992,7 @@
           </p:nvSpPr>
           <p:spPr bwMode="auto">
             <a:xfrm rot="0" flipH="0" flipV="0">
-              <a:off x="93299" y="2465469"/>
+              <a:off x="93298" y="2465468"/>
               <a:ext cx="2533649" cy="551947"/>
             </a:xfrm>
             <a:prstGeom prst="rect">
@@ -5793,7 +6084,7 @@
       </p:grpSpPr>
       <p:grpSp>
         <p:nvGrpSpPr>
-          <p:cNvPr id="1534121197" name=""/>
+          <p:cNvPr id="701008510" name=""/>
           <p:cNvGrpSpPr/>
           <p:nvPr/>
         </p:nvGrpSpPr>
@@ -5909,14 +6200,14 @@
       </p:grpSp>
       <p:sp>
         <p:nvSpPr>
-          <p:cNvPr id="636222820" name=""/>
+          <p:cNvPr id="1672042497" name=""/>
           <p:cNvSpPr txBox="1"/>
           <p:nvPr/>
         </p:nvSpPr>
         <p:spPr bwMode="auto">
           <a:xfrm rot="0" flipH="0" flipV="0">
-            <a:off x="2687999" y="769189"/>
-            <a:ext cx="3163019" cy="396599"/>
+            <a:off x="2687998" y="769188"/>
+            <a:ext cx="3163378" cy="396599"/>
           </a:xfrm>
           <a:prstGeom prst="rect">
             <a:avLst/>
@@ -5932,16 +6223,24 @@
               <a:defRPr/>
             </a:pPr>
             <a:r>
-              <a:rPr lang="fr-CH" sz="2000" b="1"/>
+              <a:rPr lang="fr-CH" sz="2000" b="1">
+                <a:solidFill>
+                  <a:srgbClr val="263238"/>
+                </a:solidFill>
+              </a:rPr>
               <a:t>Development Workflow</a:t>
             </a:r>
-            <a:endParaRPr sz="2000" b="1"/>
-          </a:p>
-        </p:txBody>
-      </p:sp>
-      <p:sp>
-        <p:nvSpPr>
-          <p:cNvPr id="707666194" name=""/>
+            <a:endParaRPr sz="2000" b="1">
+              <a:solidFill>
+                <a:srgbClr val="263238"/>
+              </a:solidFill>
+            </a:endParaRPr>
+          </a:p>
+        </p:txBody>
+      </p:sp>
+      <p:sp>
+        <p:nvSpPr>
+          <p:cNvPr id="147969876" name=""/>
           <p:cNvSpPr/>
           <p:nvPr/>
         </p:nvSpPr>
@@ -5994,18 +6293,608 @@
           </a:p>
         </p:txBody>
       </p:sp>
+      <p:sp>
+        <p:nvSpPr>
+          <p:cNvPr id="1063191098" name=""/>
+          <p:cNvSpPr/>
+          <p:nvPr/>
+        </p:nvSpPr>
+        <p:spPr bwMode="auto">
+          <a:xfrm rot="0" flipH="0" flipV="0">
+            <a:off x="7412399" y="1504197"/>
+            <a:ext cx="4610098" cy="2477251"/>
+          </a:xfrm>
+          <a:prstGeom prst="roundRect">
+            <a:avLst>
+              <a:gd name="adj" fmla="val 4157"/>
+            </a:avLst>
+          </a:prstGeom>
+          <a:solidFill>
+            <a:schemeClr val="bg1"/>
+          </a:solidFill>
+          <a:ln w="12700" cap="flat" cmpd="sng" algn="ctr">
+            <a:solidFill>
+              <a:schemeClr val="bg1">
+                <a:lumMod val="74901"/>
+              </a:schemeClr>
+            </a:solidFill>
+            <a:prstDash val="solid"/>
+            <a:miter lim="800000"/>
+          </a:ln>
+        </p:spPr>
+        <p:style>
+          <a:lnRef idx="2">
+            <a:schemeClr val="accent1">
+              <a:shade val="50000"/>
+            </a:schemeClr>
+          </a:lnRef>
+          <a:fillRef idx="1">
+            <a:schemeClr val="accent1"/>
+          </a:fillRef>
+          <a:effectRef idx="0">
+            <a:schemeClr val="accent1"/>
+          </a:effectRef>
+          <a:fontRef idx="minor">
+            <a:schemeClr val="lt1"/>
+          </a:fontRef>
+        </p:style>
+        <p:txBody>
+          <a:bodyPr vertOverflow="overflow" horzOverflow="overflow" vert="horz" wrap="square" lIns="91440" tIns="45720" rIns="91440" bIns="45720" numCol="1" spcCol="0" rtlCol="0" fromWordArt="0" anchor="ctr" anchorCtr="0" forceAA="0" upright="0" compatLnSpc="0"/>
+          <a:p>
+            <a:pPr>
+              <a:defRPr/>
+            </a:pPr>
+            <a:endParaRPr/>
+          </a:p>
+        </p:txBody>
+      </p:sp>
+      <p:sp>
+        <p:nvSpPr>
+          <p:cNvPr id="1279732658" name=""/>
+          <p:cNvSpPr/>
+          <p:nvPr/>
+        </p:nvSpPr>
+        <p:spPr bwMode="auto">
+          <a:xfrm rot="0" flipH="0" flipV="0">
+            <a:off x="2687998" y="4457698"/>
+            <a:ext cx="9334497" cy="2285998"/>
+          </a:xfrm>
+          <a:prstGeom prst="roundRect">
+            <a:avLst>
+              <a:gd name="adj" fmla="val 4157"/>
+            </a:avLst>
+          </a:prstGeom>
+          <a:solidFill>
+            <a:schemeClr val="bg1"/>
+          </a:solidFill>
+          <a:ln w="12700" cap="flat" cmpd="sng" algn="ctr">
+            <a:solidFill>
+              <a:schemeClr val="bg1">
+                <a:lumMod val="74901"/>
+              </a:schemeClr>
+            </a:solidFill>
+            <a:prstDash val="solid"/>
+            <a:miter lim="800000"/>
+          </a:ln>
+        </p:spPr>
+        <p:style>
+          <a:lnRef idx="2">
+            <a:schemeClr val="accent1">
+              <a:shade val="50000"/>
+            </a:schemeClr>
+          </a:lnRef>
+          <a:fillRef idx="1">
+            <a:schemeClr val="accent1"/>
+          </a:fillRef>
+          <a:effectRef idx="0">
+            <a:schemeClr val="accent1"/>
+          </a:effectRef>
+          <a:fontRef idx="minor">
+            <a:schemeClr val="lt1"/>
+          </a:fontRef>
+        </p:style>
+        <p:txBody>
+          <a:bodyPr vertOverflow="overflow" horzOverflow="overflow" vert="horz" wrap="square" lIns="91440" tIns="45720" rIns="91440" bIns="45720" numCol="1" spcCol="0" rtlCol="0" fromWordArt="0" anchor="ctr" anchorCtr="0" forceAA="0" upright="0" compatLnSpc="0"/>
+          <a:p>
+            <a:pPr>
+              <a:defRPr/>
+            </a:pPr>
+            <a:endParaRPr/>
+          </a:p>
+        </p:txBody>
+      </p:sp>
+      <p:sp>
+        <p:nvSpPr>
+          <p:cNvPr id="411615263" name=""/>
+          <p:cNvSpPr txBox="1"/>
+          <p:nvPr/>
+        </p:nvSpPr>
+        <p:spPr bwMode="auto">
+          <a:xfrm rot="0" flipH="0" flipV="0">
+            <a:off x="2687999" y="1138077"/>
+            <a:ext cx="1238969" cy="366119"/>
+          </a:xfrm>
+          <a:prstGeom prst="rect">
+            <a:avLst/>
+          </a:prstGeom>
+          <a:noFill/>
+        </p:spPr>
+        <p:txBody>
+          <a:bodyPr vertOverflow="overflow" horzOverflow="overflow" vert="horz" wrap="square" lIns="91440" tIns="45720" rIns="91440" bIns="45720" numCol="1" spcCol="0" rtlCol="0" fromWordArt="0" anchor="t" anchorCtr="0" forceAA="0" upright="0" compatLnSpc="0">
+            <a:spAutoFit/>
+          </a:bodyPr>
+          <a:p>
+            <a:pPr>
+              <a:defRPr/>
+            </a:pPr>
+            <a:r>
+              <a:rPr lang="fr-CH" b="1">
+                <a:solidFill>
+                  <a:schemeClr val="tx1">
+                    <a:lumMod val="65000"/>
+                    <a:lumOff val="35000"/>
+                  </a:schemeClr>
+                </a:solidFill>
+              </a:rPr>
+              <a:t>Frontend</a:t>
+            </a:r>
+            <a:endParaRPr b="1">
+              <a:solidFill>
+                <a:schemeClr val="tx1">
+                  <a:lumMod val="65000"/>
+                  <a:lumOff val="35000"/>
+                </a:schemeClr>
+              </a:solidFill>
+            </a:endParaRPr>
+          </a:p>
+        </p:txBody>
+      </p:sp>
+      <p:sp>
+        <p:nvSpPr>
+          <p:cNvPr id="84965882" name=""/>
+          <p:cNvSpPr txBox="1"/>
+          <p:nvPr/>
+        </p:nvSpPr>
+        <p:spPr bwMode="auto">
+          <a:xfrm rot="0" flipH="0" flipV="0">
+            <a:off x="7412399" y="1165789"/>
+            <a:ext cx="1258020" cy="366119"/>
+          </a:xfrm>
+          <a:prstGeom prst="rect">
+            <a:avLst/>
+          </a:prstGeom>
+          <a:noFill/>
+        </p:spPr>
+        <p:txBody>
+          <a:bodyPr vertOverflow="overflow" horzOverflow="overflow" vert="horz" wrap="square" lIns="91440" tIns="45720" rIns="91440" bIns="45720" numCol="1" spcCol="0" rtlCol="0" fromWordArt="0" anchor="t" anchorCtr="0" forceAA="0" upright="0" compatLnSpc="0">
+            <a:spAutoFit/>
+          </a:bodyPr>
+          <a:p>
+            <a:pPr>
+              <a:defRPr/>
+            </a:pPr>
+            <a:r>
+              <a:rPr lang="fr-CH" b="1">
+                <a:solidFill>
+                  <a:schemeClr val="tx1">
+                    <a:lumMod val="65000"/>
+                    <a:lumOff val="35000"/>
+                  </a:schemeClr>
+                </a:solidFill>
+              </a:rPr>
+              <a:t>Backend</a:t>
+            </a:r>
+            <a:endParaRPr b="1">
+              <a:solidFill>
+                <a:schemeClr val="tx1">
+                  <a:lumMod val="65000"/>
+                  <a:lumOff val="35000"/>
+                </a:schemeClr>
+              </a:solidFill>
+            </a:endParaRPr>
+          </a:p>
+        </p:txBody>
+      </p:sp>
+      <p:sp>
+        <p:nvSpPr>
+          <p:cNvPr id="1234300188" name=""/>
+          <p:cNvSpPr txBox="1"/>
+          <p:nvPr/>
+        </p:nvSpPr>
+        <p:spPr bwMode="auto">
+          <a:xfrm rot="0" flipH="0" flipV="0">
+            <a:off x="2687999" y="4091580"/>
+            <a:ext cx="1791419" cy="366119"/>
+          </a:xfrm>
+          <a:prstGeom prst="rect">
+            <a:avLst/>
+          </a:prstGeom>
+          <a:noFill/>
+        </p:spPr>
+        <p:txBody>
+          <a:bodyPr vertOverflow="overflow" horzOverflow="overflow" vert="horz" wrap="square" lIns="91440" tIns="45720" rIns="91440" bIns="45720" numCol="1" spcCol="0" rtlCol="0" fromWordArt="0" anchor="t" anchorCtr="0" forceAA="0" upright="0" compatLnSpc="0">
+            <a:spAutoFit/>
+          </a:bodyPr>
+          <a:p>
+            <a:pPr>
+              <a:defRPr/>
+            </a:pPr>
+            <a:r>
+              <a:rPr lang="fr-CH" b="1">
+                <a:solidFill>
+                  <a:schemeClr val="tx1">
+                    <a:lumMod val="65000"/>
+                    <a:lumOff val="35000"/>
+                  </a:schemeClr>
+                </a:solidFill>
+              </a:rPr>
+              <a:t>Infrastructure</a:t>
+            </a:r>
+            <a:endParaRPr b="1">
+              <a:solidFill>
+                <a:schemeClr val="tx1">
+                  <a:lumMod val="65000"/>
+                  <a:lumOff val="35000"/>
+                </a:schemeClr>
+              </a:solidFill>
+            </a:endParaRPr>
+          </a:p>
+        </p:txBody>
+      </p:sp>
+      <p:pic>
+        <p:nvPicPr>
+          <p:cNvPr id="694019130" name=""/>
+          <p:cNvPicPr>
+            <a:picLocks noChangeAspect="1"/>
+          </p:cNvPicPr>
+          <p:nvPr/>
+        </p:nvPicPr>
+        <p:blipFill>
+          <a:blip r:embed="rId3"/>
+          <a:stretch/>
+        </p:blipFill>
+        <p:spPr bwMode="auto">
+          <a:xfrm flipH="0" flipV="0">
+            <a:off x="2878245" y="1770298"/>
+            <a:ext cx="1715851" cy="1715851"/>
+          </a:xfrm>
+          <a:prstGeom prst="rect">
+            <a:avLst/>
+          </a:prstGeom>
+          <a:noFill/>
+          <a:ln w="6349">
+            <a:noFill/>
+            <a:prstDash val="solid"/>
+          </a:ln>
+        </p:spPr>
+      </p:pic>
+      <p:sp>
+        <p:nvSpPr>
+          <p:cNvPr id="1067789763" name=""/>
+          <p:cNvSpPr txBox="1"/>
+          <p:nvPr/>
+        </p:nvSpPr>
+        <p:spPr bwMode="auto">
+          <a:xfrm rot="0" flipH="0" flipV="0">
+            <a:off x="4897798" y="2171564"/>
+            <a:ext cx="2130749" cy="914759"/>
+          </a:xfrm>
+          <a:prstGeom prst="rect">
+            <a:avLst/>
+          </a:prstGeom>
+          <a:noFill/>
+        </p:spPr>
+        <p:txBody>
+          <a:bodyPr vertOverflow="overflow" horzOverflow="overflow" vert="horz" wrap="square" lIns="91440" tIns="45720" rIns="91440" bIns="45720" numCol="1" spcCol="0" rtlCol="0" fromWordArt="0" anchor="ctr" anchorCtr="0" forceAA="0" upright="0" compatLnSpc="0">
+            <a:spAutoFit/>
+          </a:bodyPr>
+          <a:p>
+            <a:pPr>
+              <a:lnSpc>
+                <a:spcPct val="200000"/>
+              </a:lnSpc>
+              <a:defRPr/>
+            </a:pPr>
+            <a:r>
+              <a:rPr lang="fr-CH" sz="1800" b="1">
+                <a:solidFill>
+                  <a:srgbClr val="263238"/>
+                </a:solidFill>
+                <a:latin typeface="Arial"/>
+                <a:ea typeface="Arial"/>
+                <a:cs typeface="Arial"/>
+              </a:rPr>
+              <a:t>Christen Anthony</a:t>
+            </a:r>
+            <a:endParaRPr sz="1800" b="1">
+              <a:solidFill>
+                <a:srgbClr val="263238"/>
+              </a:solidFill>
+              <a:latin typeface="Arial"/>
+              <a:cs typeface="Arial"/>
+            </a:endParaRPr>
+          </a:p>
+          <a:p>
+            <a:pPr>
+              <a:lnSpc>
+                <a:spcPct val="100000"/>
+              </a:lnSpc>
+              <a:defRPr/>
+            </a:pPr>
+            <a:r>
+              <a:rPr lang="en-US" sz="1800" b="1" i="0" u="none" strike="noStrike" cap="none" spc="0">
+                <a:solidFill>
+                  <a:srgbClr val="263238"/>
+                </a:solidFill>
+                <a:latin typeface="Arial"/>
+                <a:ea typeface="Arial"/>
+                <a:cs typeface="Arial"/>
+              </a:rPr>
+              <a:t>Badis</a:t>
+            </a:r>
+            <a:r>
+              <a:rPr lang="fr-CH" sz="1800" b="1">
+                <a:solidFill>
+                  <a:srgbClr val="263238"/>
+                </a:solidFill>
+                <a:latin typeface="Arial"/>
+                <a:ea typeface="Arial"/>
+                <a:cs typeface="Arial"/>
+              </a:rPr>
+              <a:t> </a:t>
+            </a:r>
+            <a:r>
+              <a:rPr sz="1800" b="1" i="0" u="none">
+                <a:solidFill>
+                  <a:srgbClr val="263238"/>
+                </a:solidFill>
+                <a:latin typeface="Arial"/>
+                <a:ea typeface="Arial"/>
+                <a:cs typeface="Arial"/>
+              </a:rPr>
+              <a:t>Machraoui</a:t>
+            </a:r>
+            <a:endParaRPr sz="1800" b="1">
+              <a:solidFill>
+                <a:srgbClr val="263238"/>
+              </a:solidFill>
+              <a:latin typeface="Arial"/>
+              <a:cs typeface="Arial"/>
+            </a:endParaRPr>
+          </a:p>
+        </p:txBody>
+      </p:sp>
+      <p:pic>
+        <p:nvPicPr>
+          <p:cNvPr id="1350103568" name=""/>
+          <p:cNvPicPr>
+            <a:picLocks noChangeAspect="1"/>
+          </p:cNvPicPr>
+          <p:nvPr/>
+        </p:nvPicPr>
+        <p:blipFill>
+          <a:blip r:embed="rId4"/>
+          <a:stretch/>
+        </p:blipFill>
+        <p:spPr bwMode="auto">
+          <a:xfrm flipH="0" flipV="0">
+            <a:off x="7507395" y="1770298"/>
+            <a:ext cx="1945049" cy="1945049"/>
+          </a:xfrm>
+          <a:prstGeom prst="rect">
+            <a:avLst/>
+          </a:prstGeom>
+        </p:spPr>
+      </p:pic>
+      <p:sp>
+        <p:nvSpPr>
+          <p:cNvPr id="60707325" name=""/>
+          <p:cNvSpPr txBox="1"/>
+          <p:nvPr/>
+        </p:nvSpPr>
+        <p:spPr bwMode="auto">
+          <a:xfrm rot="0" flipH="0" flipV="0">
+            <a:off x="9374549" y="2177864"/>
+            <a:ext cx="2296107" cy="914759"/>
+          </a:xfrm>
+          <a:prstGeom prst="rect">
+            <a:avLst/>
+          </a:prstGeom>
+          <a:noFill/>
+        </p:spPr>
+        <p:txBody>
+          <a:bodyPr vertOverflow="overflow" horzOverflow="overflow" vert="horz" wrap="square" lIns="91440" tIns="45720" rIns="91440" bIns="45720" numCol="1" spcCol="0" rtlCol="0" fromWordArt="0" anchor="ctr" anchorCtr="0" forceAA="0" upright="0" compatLnSpc="0">
+            <a:spAutoFit/>
+          </a:bodyPr>
+          <a:p>
+            <a:pPr>
+              <a:lnSpc>
+                <a:spcPct val="200000"/>
+              </a:lnSpc>
+              <a:defRPr/>
+            </a:pPr>
+            <a:r>
+              <a:rPr lang="fr-CH" sz="1800" b="1">
+                <a:solidFill>
+                  <a:srgbClr val="263238"/>
+                </a:solidFill>
+                <a:latin typeface="Arial"/>
+                <a:ea typeface="Arial"/>
+                <a:cs typeface="Arial"/>
+              </a:rPr>
+              <a:t>Fabrice Chapuis</a:t>
+            </a:r>
+            <a:endParaRPr sz="1800" b="1">
+              <a:solidFill>
+                <a:srgbClr val="263238"/>
+              </a:solidFill>
+              <a:latin typeface="Arial"/>
+              <a:cs typeface="Arial"/>
+            </a:endParaRPr>
+          </a:p>
+          <a:p>
+            <a:pPr>
+              <a:lnSpc>
+                <a:spcPct val="100000"/>
+              </a:lnSpc>
+              <a:defRPr/>
+            </a:pPr>
+            <a:r>
+              <a:rPr lang="fr-CH" sz="1800" b="1" i="0" u="none">
+                <a:solidFill>
+                  <a:srgbClr val="263238"/>
+                </a:solidFill>
+                <a:latin typeface="Arial"/>
+                <a:ea typeface="Arial"/>
+                <a:cs typeface="Arial"/>
+              </a:rPr>
+              <a:t>Sven Ferreira Silva</a:t>
+            </a:r>
+            <a:endParaRPr sz="1800" b="1">
+              <a:solidFill>
+                <a:srgbClr val="263238"/>
+              </a:solidFill>
+              <a:latin typeface="Arial"/>
+              <a:cs typeface="Arial"/>
+            </a:endParaRPr>
+          </a:p>
+        </p:txBody>
+      </p:sp>
+      <p:pic>
+        <p:nvPicPr>
+          <p:cNvPr id="251407417" name=""/>
+          <p:cNvPicPr>
+            <a:picLocks noChangeAspect="1"/>
+          </p:cNvPicPr>
+          <p:nvPr/>
+        </p:nvPicPr>
+        <p:blipFill>
+          <a:blip r:embed="rId5"/>
+          <a:stretch/>
+        </p:blipFill>
+        <p:spPr bwMode="auto">
+          <a:xfrm flipH="0" flipV="0">
+            <a:off x="4050434" y="4658084"/>
+            <a:ext cx="1885230" cy="1885230"/>
+          </a:xfrm>
+          <a:prstGeom prst="rect">
+            <a:avLst/>
+          </a:prstGeom>
+        </p:spPr>
+      </p:pic>
+      <p:sp>
+        <p:nvSpPr>
+          <p:cNvPr id="242171158" name=""/>
+          <p:cNvSpPr txBox="1"/>
+          <p:nvPr/>
+        </p:nvSpPr>
+        <p:spPr bwMode="auto">
+          <a:xfrm rot="0" flipH="0" flipV="0">
+            <a:off x="7507395" y="4732738"/>
+            <a:ext cx="3380967" cy="1737720"/>
+          </a:xfrm>
+          <a:prstGeom prst="rect">
+            <a:avLst/>
+          </a:prstGeom>
+          <a:noFill/>
+        </p:spPr>
+        <p:txBody>
+          <a:bodyPr vertOverflow="overflow" horzOverflow="overflow" vert="horz" wrap="square" lIns="91440" tIns="45720" rIns="91440" bIns="45720" numCol="1" spcCol="0" rtlCol="0" fromWordArt="0" anchor="ctr" anchorCtr="0" forceAA="0" upright="0" compatLnSpc="0">
+            <a:spAutoFit/>
+          </a:bodyPr>
+          <a:p>
+            <a:pPr>
+              <a:lnSpc>
+                <a:spcPct val="200000"/>
+              </a:lnSpc>
+              <a:defRPr/>
+            </a:pPr>
+            <a:r>
+              <a:rPr sz="1800" b="1" i="0" u="none">
+                <a:solidFill>
+                  <a:srgbClr val="263238"/>
+                </a:solidFill>
+                <a:latin typeface="Arial"/>
+                <a:ea typeface="Arial"/>
+                <a:cs typeface="Arial"/>
+              </a:rPr>
+              <a:t>Carvalheiro Heleno Gonçalo</a:t>
+            </a:r>
+            <a:endParaRPr sz="1800" b="1">
+              <a:solidFill>
+                <a:srgbClr val="263238"/>
+              </a:solidFill>
+              <a:latin typeface="Arial"/>
+              <a:cs typeface="Arial"/>
+            </a:endParaRPr>
+          </a:p>
+          <a:p>
+            <a:pPr>
+              <a:lnSpc>
+                <a:spcPct val="200000"/>
+              </a:lnSpc>
+              <a:defRPr/>
+            </a:pPr>
+            <a:r>
+              <a:rPr lang="fr-CH" sz="1800" b="1" i="0" u="none">
+                <a:solidFill>
+                  <a:srgbClr val="263238"/>
+                </a:solidFill>
+                <a:latin typeface="Arial"/>
+                <a:ea typeface="Arial"/>
+                <a:cs typeface="Arial"/>
+              </a:rPr>
+              <a:t>Renovate</a:t>
+            </a:r>
+            <a:endParaRPr lang="fr-CH" sz="1800" b="1" i="0" u="none">
+              <a:solidFill>
+                <a:srgbClr val="263238"/>
+              </a:solidFill>
+              <a:latin typeface="Arial"/>
+              <a:ea typeface="Arial"/>
+              <a:cs typeface="Arial"/>
+            </a:endParaRPr>
+          </a:p>
+          <a:p>
+            <a:pPr>
+              <a:lnSpc>
+                <a:spcPct val="200000"/>
+              </a:lnSpc>
+              <a:defRPr/>
+            </a:pPr>
+            <a:r>
+              <a:rPr lang="fr-CH" sz="1800" b="1" i="0" u="none">
+                <a:solidFill>
+                  <a:srgbClr val="263238"/>
+                </a:solidFill>
+                <a:latin typeface="Arial"/>
+                <a:ea typeface="Arial"/>
+                <a:cs typeface="Arial"/>
+              </a:rPr>
+              <a:t>Renovate’s Friends</a:t>
+            </a:r>
+            <a:endParaRPr sz="1800" b="1">
+              <a:solidFill>
+                <a:srgbClr val="263238"/>
+              </a:solidFill>
+              <a:latin typeface="Arial"/>
+              <a:cs typeface="Arial"/>
+            </a:endParaRPr>
+          </a:p>
+        </p:txBody>
+      </p:sp>
       <p:grpSp>
         <p:nvGrpSpPr>
-          <p:cNvPr id="583466439" name=""/>
+          <p:cNvPr id="1927744005" name=""/>
           <p:cNvGrpSpPr/>
           <p:nvPr/>
         </p:nvGrpSpPr>
         <p:grpSpPr bwMode="auto">
           <a:xfrm>
-            <a:off x="-93299" y="-133349"/>
-            <a:ext cx="2626949" cy="6976310"/>
+            <a:off x="-93298" y="-133348"/>
+            <a:ext cx="2626948" cy="6976309"/>
             <a:chOff x="0" y="0"/>
-            <a:chExt cx="2626949" cy="6976310"/>
+            <a:chExt cx="2626948" cy="6976309"/>
           </a:xfrm>
         </p:grpSpPr>
         <p:sp>
@@ -6025,6 +6914,13 @@
             <a:solidFill>
               <a:srgbClr val="263238"/>
             </a:solidFill>
+            <a:ln w="12700" cap="flat" cmpd="sng" algn="ctr">
+              <a:solidFill>
+                <a:srgbClr val="263238"/>
+              </a:solidFill>
+              <a:prstDash val="solid"/>
+              <a:miter lim="800000"/>
+            </a:ln>
           </p:spPr>
           <p:style>
             <a:lnRef idx="2">
@@ -6052,12 +6948,12 @@
             <p:nvPr/>
           </p:nvPicPr>
           <p:blipFill>
-            <a:blip r:embed="rId3"/>
+            <a:blip r:embed="rId6"/>
             <a:stretch/>
           </p:blipFill>
           <p:spPr bwMode="auto">
-            <a:xfrm>
-              <a:off x="93299" y="133349"/>
+            <a:xfrm rot="0" flipH="0" flipV="0">
+              <a:off x="93298" y="133348"/>
               <a:ext cx="2533649" cy="676274"/>
             </a:xfrm>
             <a:prstGeom prst="rect">
@@ -6073,7 +6969,7 @@
           </p:nvSpPr>
           <p:spPr bwMode="auto">
             <a:xfrm rot="0" flipH="0" flipV="0">
-              <a:off x="93299" y="809624"/>
+              <a:off x="93298" y="809623"/>
               <a:ext cx="2533649" cy="551948"/>
             </a:xfrm>
             <a:prstGeom prst="rect">
@@ -6128,7 +7024,7 @@
           </p:nvSpPr>
           <p:spPr bwMode="auto">
             <a:xfrm rot="0" flipH="0" flipV="0">
-              <a:off x="93299" y="1361573"/>
+              <a:off x="93298" y="1361572"/>
               <a:ext cx="2533649" cy="551947"/>
             </a:xfrm>
             <a:prstGeom prst="rect">
@@ -6183,7 +7079,7 @@
           </p:nvSpPr>
           <p:spPr bwMode="auto">
             <a:xfrm rot="0" flipH="0" flipV="0">
-              <a:off x="93299" y="1913521"/>
+              <a:off x="93298" y="1913520"/>
               <a:ext cx="2533649" cy="551947"/>
             </a:xfrm>
             <a:prstGeom prst="rect">
@@ -6238,7 +7134,7 @@
           </p:nvSpPr>
           <p:spPr bwMode="auto">
             <a:xfrm rot="0" flipH="0" flipV="0">
-              <a:off x="93299" y="2465469"/>
+              <a:off x="93298" y="2465468"/>
               <a:ext cx="2533649" cy="551947"/>
             </a:xfrm>
             <a:prstGeom prst="rect">
@@ -6286,596 +7182,6 @@
           </p:txBody>
         </p:sp>
       </p:grpSp>
-      <p:sp>
-        <p:nvSpPr>
-          <p:cNvPr id="174379344" name=""/>
-          <p:cNvSpPr/>
-          <p:nvPr/>
-        </p:nvSpPr>
-        <p:spPr bwMode="auto">
-          <a:xfrm rot="0" flipH="0" flipV="0">
-            <a:off x="7412399" y="1504197"/>
-            <a:ext cx="4610098" cy="2477251"/>
-          </a:xfrm>
-          <a:prstGeom prst="roundRect">
-            <a:avLst>
-              <a:gd name="adj" fmla="val 4157"/>
-            </a:avLst>
-          </a:prstGeom>
-          <a:solidFill>
-            <a:schemeClr val="bg1"/>
-          </a:solidFill>
-          <a:ln w="12700" cap="flat" cmpd="sng" algn="ctr">
-            <a:solidFill>
-              <a:schemeClr val="bg1">
-                <a:lumMod val="74901"/>
-              </a:schemeClr>
-            </a:solidFill>
-            <a:prstDash val="solid"/>
-            <a:miter lim="800000"/>
-          </a:ln>
-        </p:spPr>
-        <p:style>
-          <a:lnRef idx="2">
-            <a:schemeClr val="accent1">
-              <a:shade val="50000"/>
-            </a:schemeClr>
-          </a:lnRef>
-          <a:fillRef idx="1">
-            <a:schemeClr val="accent1"/>
-          </a:fillRef>
-          <a:effectRef idx="0">
-            <a:schemeClr val="accent1"/>
-          </a:effectRef>
-          <a:fontRef idx="minor">
-            <a:schemeClr val="lt1"/>
-          </a:fontRef>
-        </p:style>
-        <p:txBody>
-          <a:bodyPr vertOverflow="overflow" horzOverflow="overflow" vert="horz" wrap="square" lIns="91440" tIns="45720" rIns="91440" bIns="45720" numCol="1" spcCol="0" rtlCol="0" fromWordArt="0" anchor="ctr" anchorCtr="0" forceAA="0" upright="0" compatLnSpc="0"/>
-          <a:p>
-            <a:pPr>
-              <a:defRPr/>
-            </a:pPr>
-            <a:endParaRPr/>
-          </a:p>
-        </p:txBody>
-      </p:sp>
-      <p:sp>
-        <p:nvSpPr>
-          <p:cNvPr id="846439411" name=""/>
-          <p:cNvSpPr/>
-          <p:nvPr/>
-        </p:nvSpPr>
-        <p:spPr bwMode="auto">
-          <a:xfrm rot="0" flipH="0" flipV="0">
-            <a:off x="2687999" y="4457699"/>
-            <a:ext cx="9334498" cy="2285999"/>
-          </a:xfrm>
-          <a:prstGeom prst="roundRect">
-            <a:avLst>
-              <a:gd name="adj" fmla="val 4157"/>
-            </a:avLst>
-          </a:prstGeom>
-          <a:solidFill>
-            <a:schemeClr val="bg1"/>
-          </a:solidFill>
-          <a:ln w="12700" cap="flat" cmpd="sng" algn="ctr">
-            <a:solidFill>
-              <a:schemeClr val="bg1">
-                <a:lumMod val="74901"/>
-              </a:schemeClr>
-            </a:solidFill>
-            <a:prstDash val="solid"/>
-            <a:miter lim="800000"/>
-          </a:ln>
-        </p:spPr>
-        <p:style>
-          <a:lnRef idx="2">
-            <a:schemeClr val="accent1">
-              <a:shade val="50000"/>
-            </a:schemeClr>
-          </a:lnRef>
-          <a:fillRef idx="1">
-            <a:schemeClr val="accent1"/>
-          </a:fillRef>
-          <a:effectRef idx="0">
-            <a:schemeClr val="accent1"/>
-          </a:effectRef>
-          <a:fontRef idx="minor">
-            <a:schemeClr val="lt1"/>
-          </a:fontRef>
-        </p:style>
-        <p:txBody>
-          <a:bodyPr vertOverflow="overflow" horzOverflow="overflow" vert="horz" wrap="square" lIns="91440" tIns="45720" rIns="91440" bIns="45720" numCol="1" spcCol="0" rtlCol="0" fromWordArt="0" anchor="ctr" anchorCtr="0" forceAA="0" upright="0" compatLnSpc="0"/>
-          <a:p>
-            <a:pPr>
-              <a:defRPr/>
-            </a:pPr>
-            <a:endParaRPr/>
-          </a:p>
-        </p:txBody>
-      </p:sp>
-      <p:sp>
-        <p:nvSpPr>
-          <p:cNvPr id="776926338" name=""/>
-          <p:cNvSpPr txBox="1"/>
-          <p:nvPr/>
-        </p:nvSpPr>
-        <p:spPr bwMode="auto">
-          <a:xfrm rot="0" flipH="0" flipV="0">
-            <a:off x="2687999" y="1138077"/>
-            <a:ext cx="1238969" cy="366119"/>
-          </a:xfrm>
-          <a:prstGeom prst="rect">
-            <a:avLst/>
-          </a:prstGeom>
-          <a:noFill/>
-        </p:spPr>
-        <p:txBody>
-          <a:bodyPr vertOverflow="overflow" horzOverflow="overflow" vert="horz" wrap="square" lIns="91440" tIns="45720" rIns="91440" bIns="45720" numCol="1" spcCol="0" rtlCol="0" fromWordArt="0" anchor="t" anchorCtr="0" forceAA="0" upright="0" compatLnSpc="0">
-            <a:spAutoFit/>
-          </a:bodyPr>
-          <a:p>
-            <a:pPr>
-              <a:defRPr/>
-            </a:pPr>
-            <a:r>
-              <a:rPr lang="fr-CH" b="1">
-                <a:solidFill>
-                  <a:schemeClr val="tx1">
-                    <a:lumMod val="65000"/>
-                    <a:lumOff val="35000"/>
-                  </a:schemeClr>
-                </a:solidFill>
-              </a:rPr>
-              <a:t>Frontend</a:t>
-            </a:r>
-            <a:endParaRPr b="1">
-              <a:solidFill>
-                <a:schemeClr val="tx1">
-                  <a:lumMod val="65000"/>
-                  <a:lumOff val="35000"/>
-                </a:schemeClr>
-              </a:solidFill>
-            </a:endParaRPr>
-          </a:p>
-        </p:txBody>
-      </p:sp>
-      <p:sp>
-        <p:nvSpPr>
-          <p:cNvPr id="1469265684" name=""/>
-          <p:cNvSpPr txBox="1"/>
-          <p:nvPr/>
-        </p:nvSpPr>
-        <p:spPr bwMode="auto">
-          <a:xfrm rot="0" flipH="0" flipV="0">
-            <a:off x="7412399" y="1165789"/>
-            <a:ext cx="1258020" cy="366119"/>
-          </a:xfrm>
-          <a:prstGeom prst="rect">
-            <a:avLst/>
-          </a:prstGeom>
-          <a:noFill/>
-        </p:spPr>
-        <p:txBody>
-          <a:bodyPr vertOverflow="overflow" horzOverflow="overflow" vert="horz" wrap="square" lIns="91440" tIns="45720" rIns="91440" bIns="45720" numCol="1" spcCol="0" rtlCol="0" fromWordArt="0" anchor="t" anchorCtr="0" forceAA="0" upright="0" compatLnSpc="0">
-            <a:spAutoFit/>
-          </a:bodyPr>
-          <a:p>
-            <a:pPr>
-              <a:defRPr/>
-            </a:pPr>
-            <a:r>
-              <a:rPr lang="fr-CH" b="1">
-                <a:solidFill>
-                  <a:schemeClr val="tx1">
-                    <a:lumMod val="65000"/>
-                    <a:lumOff val="35000"/>
-                  </a:schemeClr>
-                </a:solidFill>
-              </a:rPr>
-              <a:t>Backend</a:t>
-            </a:r>
-            <a:endParaRPr b="1">
-              <a:solidFill>
-                <a:schemeClr val="tx1">
-                  <a:lumMod val="65000"/>
-                  <a:lumOff val="35000"/>
-                </a:schemeClr>
-              </a:solidFill>
-            </a:endParaRPr>
-          </a:p>
-        </p:txBody>
-      </p:sp>
-      <p:sp>
-        <p:nvSpPr>
-          <p:cNvPr id="1967407791" name=""/>
-          <p:cNvSpPr txBox="1"/>
-          <p:nvPr/>
-        </p:nvSpPr>
-        <p:spPr bwMode="auto">
-          <a:xfrm rot="0" flipH="0" flipV="0">
-            <a:off x="2687999" y="4091580"/>
-            <a:ext cx="1791419" cy="366119"/>
-          </a:xfrm>
-          <a:prstGeom prst="rect">
-            <a:avLst/>
-          </a:prstGeom>
-          <a:noFill/>
-        </p:spPr>
-        <p:txBody>
-          <a:bodyPr vertOverflow="overflow" horzOverflow="overflow" vert="horz" wrap="square" lIns="91440" tIns="45720" rIns="91440" bIns="45720" numCol="1" spcCol="0" rtlCol="0" fromWordArt="0" anchor="t" anchorCtr="0" forceAA="0" upright="0" compatLnSpc="0">
-            <a:spAutoFit/>
-          </a:bodyPr>
-          <a:p>
-            <a:pPr>
-              <a:defRPr/>
-            </a:pPr>
-            <a:r>
-              <a:rPr lang="fr-CH" b="1">
-                <a:solidFill>
-                  <a:schemeClr val="tx1">
-                    <a:lumMod val="65000"/>
-                    <a:lumOff val="35000"/>
-                  </a:schemeClr>
-                </a:solidFill>
-              </a:rPr>
-              <a:t>Infrastructure</a:t>
-            </a:r>
-            <a:endParaRPr b="1">
-              <a:solidFill>
-                <a:schemeClr val="tx1">
-                  <a:lumMod val="65000"/>
-                  <a:lumOff val="35000"/>
-                </a:schemeClr>
-              </a:solidFill>
-            </a:endParaRPr>
-          </a:p>
-        </p:txBody>
-      </p:sp>
-      <p:pic>
-        <p:nvPicPr>
-          <p:cNvPr id="1403376293" name=""/>
-          <p:cNvPicPr>
-            <a:picLocks noChangeAspect="1"/>
-          </p:cNvPicPr>
-          <p:nvPr/>
-        </p:nvPicPr>
-        <p:blipFill>
-          <a:blip r:embed="rId4"/>
-          <a:stretch/>
-        </p:blipFill>
-        <p:spPr bwMode="auto">
-          <a:xfrm flipH="0" flipV="0">
-            <a:off x="2878245" y="1770298"/>
-            <a:ext cx="1715851" cy="1715851"/>
-          </a:xfrm>
-          <a:prstGeom prst="rect">
-            <a:avLst/>
-          </a:prstGeom>
-          <a:noFill/>
-          <a:ln w="6349">
-            <a:noFill/>
-            <a:prstDash val="solid"/>
-          </a:ln>
-        </p:spPr>
-      </p:pic>
-      <p:sp>
-        <p:nvSpPr>
-          <p:cNvPr id="258775123" name=""/>
-          <p:cNvSpPr txBox="1"/>
-          <p:nvPr/>
-        </p:nvSpPr>
-        <p:spPr bwMode="auto">
-          <a:xfrm rot="0" flipH="0" flipV="0">
-            <a:off x="4897799" y="2171564"/>
-            <a:ext cx="2130749" cy="914759"/>
-          </a:xfrm>
-          <a:prstGeom prst="rect">
-            <a:avLst/>
-          </a:prstGeom>
-          <a:noFill/>
-        </p:spPr>
-        <p:txBody>
-          <a:bodyPr vertOverflow="overflow" horzOverflow="overflow" vert="horz" wrap="square" lIns="91440" tIns="45720" rIns="91440" bIns="45720" numCol="1" spcCol="0" rtlCol="0" fromWordArt="0" anchor="ctr" anchorCtr="0" forceAA="0" upright="0" compatLnSpc="0">
-            <a:spAutoFit/>
-          </a:bodyPr>
-          <a:p>
-            <a:pPr>
-              <a:lnSpc>
-                <a:spcPct val="200000"/>
-              </a:lnSpc>
-              <a:defRPr/>
-            </a:pPr>
-            <a:r>
-              <a:rPr lang="fr-CH" sz="1800" b="1">
-                <a:solidFill>
-                  <a:srgbClr val="263238"/>
-                </a:solidFill>
-                <a:latin typeface="Arial"/>
-                <a:ea typeface="Arial"/>
-                <a:cs typeface="Arial"/>
-              </a:rPr>
-              <a:t>Christen Anthony</a:t>
-            </a:r>
-            <a:endParaRPr sz="1800" b="1">
-              <a:solidFill>
-                <a:srgbClr val="263238"/>
-              </a:solidFill>
-              <a:latin typeface="Arial"/>
-              <a:cs typeface="Arial"/>
-            </a:endParaRPr>
-          </a:p>
-          <a:p>
-            <a:pPr>
-              <a:lnSpc>
-                <a:spcPct val="100000"/>
-              </a:lnSpc>
-              <a:defRPr/>
-            </a:pPr>
-            <a:r>
-              <a:rPr lang="en-US" sz="1800" b="1" i="0" u="none" strike="noStrike" cap="none" spc="0">
-                <a:solidFill>
-                  <a:srgbClr val="263238"/>
-                </a:solidFill>
-                <a:latin typeface="Arial"/>
-                <a:ea typeface="Arial"/>
-                <a:cs typeface="Arial"/>
-              </a:rPr>
-              <a:t>Badis</a:t>
-            </a:r>
-            <a:r>
-              <a:rPr lang="fr-CH" sz="1800" b="1">
-                <a:solidFill>
-                  <a:srgbClr val="263238"/>
-                </a:solidFill>
-                <a:latin typeface="Arial"/>
-                <a:ea typeface="Arial"/>
-                <a:cs typeface="Arial"/>
-              </a:rPr>
-              <a:t> </a:t>
-            </a:r>
-            <a:r>
-              <a:rPr sz="1800" b="1" i="0" u="none">
-                <a:solidFill>
-                  <a:srgbClr val="263238"/>
-                </a:solidFill>
-                <a:latin typeface="Arial"/>
-                <a:ea typeface="Arial"/>
-                <a:cs typeface="Arial"/>
-              </a:rPr>
-              <a:t>Machraoui</a:t>
-            </a:r>
-            <a:endParaRPr sz="1800" b="1">
-              <a:solidFill>
-                <a:srgbClr val="263238"/>
-              </a:solidFill>
-              <a:latin typeface="Arial"/>
-              <a:cs typeface="Arial"/>
-            </a:endParaRPr>
-          </a:p>
-        </p:txBody>
-      </p:sp>
-      <p:pic>
-        <p:nvPicPr>
-          <p:cNvPr id="1719145333" name=""/>
-          <p:cNvPicPr>
-            <a:picLocks noChangeAspect="1"/>
-          </p:cNvPicPr>
-          <p:nvPr/>
-        </p:nvPicPr>
-        <p:blipFill>
-          <a:blip r:embed="rId5"/>
-          <a:stretch/>
-        </p:blipFill>
-        <p:spPr bwMode="auto">
-          <a:xfrm flipH="0" flipV="0">
-            <a:off x="7507395" y="1770298"/>
-            <a:ext cx="1945049" cy="1945049"/>
-          </a:xfrm>
-          <a:prstGeom prst="rect">
-            <a:avLst/>
-          </a:prstGeom>
-        </p:spPr>
-      </p:pic>
-      <p:sp>
-        <p:nvSpPr>
-          <p:cNvPr id="2120093562" name=""/>
-          <p:cNvSpPr txBox="1"/>
-          <p:nvPr/>
-        </p:nvSpPr>
-        <p:spPr bwMode="auto">
-          <a:xfrm rot="0" flipH="0" flipV="0">
-            <a:off x="9374549" y="2177864"/>
-            <a:ext cx="2296107" cy="914759"/>
-          </a:xfrm>
-          <a:prstGeom prst="rect">
-            <a:avLst/>
-          </a:prstGeom>
-          <a:noFill/>
-        </p:spPr>
-        <p:txBody>
-          <a:bodyPr vertOverflow="overflow" horzOverflow="overflow" vert="horz" wrap="square" lIns="91440" tIns="45720" rIns="91440" bIns="45720" numCol="1" spcCol="0" rtlCol="0" fromWordArt="0" anchor="ctr" anchorCtr="0" forceAA="0" upright="0" compatLnSpc="0">
-            <a:spAutoFit/>
-          </a:bodyPr>
-          <a:p>
-            <a:pPr>
-              <a:lnSpc>
-                <a:spcPct val="200000"/>
-              </a:lnSpc>
-              <a:defRPr/>
-            </a:pPr>
-            <a:r>
-              <a:rPr lang="fr-CH" sz="1800" b="1">
-                <a:solidFill>
-                  <a:srgbClr val="263238"/>
-                </a:solidFill>
-                <a:latin typeface="Arial"/>
-                <a:ea typeface="Arial"/>
-                <a:cs typeface="Arial"/>
-              </a:rPr>
-              <a:t>Fabrice Chapuis</a:t>
-            </a:r>
-            <a:endParaRPr sz="1800" b="1">
-              <a:solidFill>
-                <a:srgbClr val="263238"/>
-              </a:solidFill>
-              <a:latin typeface="Arial"/>
-              <a:cs typeface="Arial"/>
-            </a:endParaRPr>
-          </a:p>
-          <a:p>
-            <a:pPr>
-              <a:lnSpc>
-                <a:spcPct val="100000"/>
-              </a:lnSpc>
-              <a:defRPr/>
-            </a:pPr>
-            <a:r>
-              <a:rPr lang="fr-CH" sz="1800" b="1" i="0" u="none">
-                <a:solidFill>
-                  <a:srgbClr val="263238"/>
-                </a:solidFill>
-                <a:latin typeface="Arial"/>
-                <a:ea typeface="Arial"/>
-                <a:cs typeface="Arial"/>
-              </a:rPr>
-              <a:t>Sven Ferreira Silva</a:t>
-            </a:r>
-            <a:endParaRPr sz="1800" b="1">
-              <a:solidFill>
-                <a:srgbClr val="263238"/>
-              </a:solidFill>
-              <a:latin typeface="Arial"/>
-              <a:cs typeface="Arial"/>
-            </a:endParaRPr>
-          </a:p>
-        </p:txBody>
-      </p:sp>
-      <p:pic>
-        <p:nvPicPr>
-          <p:cNvPr id="1226785180" name=""/>
-          <p:cNvPicPr>
-            <a:picLocks noChangeAspect="1"/>
-          </p:cNvPicPr>
-          <p:nvPr/>
-        </p:nvPicPr>
-        <p:blipFill>
-          <a:blip r:embed="rId6"/>
-          <a:stretch/>
-        </p:blipFill>
-        <p:spPr bwMode="auto">
-          <a:xfrm flipH="0" flipV="0">
-            <a:off x="4050434" y="4658084"/>
-            <a:ext cx="1885230" cy="1885230"/>
-          </a:xfrm>
-          <a:prstGeom prst="rect">
-            <a:avLst/>
-          </a:prstGeom>
-        </p:spPr>
-      </p:pic>
-      <p:sp>
-        <p:nvSpPr>
-          <p:cNvPr id="1760846622" name=""/>
-          <p:cNvSpPr txBox="1"/>
-          <p:nvPr/>
-        </p:nvSpPr>
-        <p:spPr bwMode="auto">
-          <a:xfrm rot="0" flipH="0" flipV="0">
-            <a:off x="7507395" y="4732379"/>
-            <a:ext cx="3380247" cy="1737720"/>
-          </a:xfrm>
-          <a:prstGeom prst="rect">
-            <a:avLst/>
-          </a:prstGeom>
-          <a:noFill/>
-        </p:spPr>
-        <p:txBody>
-          <a:bodyPr vertOverflow="overflow" horzOverflow="overflow" vert="horz" wrap="square" lIns="91440" tIns="45720" rIns="91440" bIns="45720" numCol="1" spcCol="0" rtlCol="0" fromWordArt="0" anchor="ctr" anchorCtr="0" forceAA="0" upright="0" compatLnSpc="0">
-            <a:spAutoFit/>
-          </a:bodyPr>
-          <a:p>
-            <a:pPr>
-              <a:lnSpc>
-                <a:spcPct val="200000"/>
-              </a:lnSpc>
-              <a:defRPr/>
-            </a:pPr>
-            <a:r>
-              <a:rPr sz="1800" b="1" i="0" u="none">
-                <a:solidFill>
-                  <a:srgbClr val="000000"/>
-                </a:solidFill>
-                <a:latin typeface="Arial"/>
-                <a:ea typeface="Arial"/>
-                <a:cs typeface="Arial"/>
-              </a:rPr>
-              <a:t>Carvalheiro Heleno Gonçalo</a:t>
-            </a:r>
-            <a:endParaRPr sz="1800" b="1">
-              <a:solidFill>
-                <a:srgbClr val="263238"/>
-              </a:solidFill>
-              <a:latin typeface="Arial"/>
-              <a:cs typeface="Arial"/>
-            </a:endParaRPr>
-          </a:p>
-          <a:p>
-            <a:pPr>
-              <a:lnSpc>
-                <a:spcPct val="200000"/>
-              </a:lnSpc>
-              <a:defRPr/>
-            </a:pPr>
-            <a:r>
-              <a:rPr lang="fr-CH" sz="1800" b="1" i="0" u="none">
-                <a:solidFill>
-                  <a:srgbClr val="263238"/>
-                </a:solidFill>
-                <a:latin typeface="Arial"/>
-                <a:ea typeface="Arial"/>
-                <a:cs typeface="Arial"/>
-              </a:rPr>
-              <a:t>Renovate</a:t>
-            </a:r>
-            <a:endParaRPr lang="fr-CH" sz="1800" b="1" i="0" u="none">
-              <a:solidFill>
-                <a:srgbClr val="263238"/>
-              </a:solidFill>
-              <a:latin typeface="Arial"/>
-              <a:ea typeface="Arial"/>
-              <a:cs typeface="Arial"/>
-            </a:endParaRPr>
-          </a:p>
-          <a:p>
-            <a:pPr>
-              <a:lnSpc>
-                <a:spcPct val="200000"/>
-              </a:lnSpc>
-              <a:defRPr/>
-            </a:pPr>
-            <a:r>
-              <a:rPr lang="fr-CH" sz="1800" b="1" i="0" u="none">
-                <a:solidFill>
-                  <a:srgbClr val="263238"/>
-                </a:solidFill>
-                <a:latin typeface="Arial"/>
-                <a:ea typeface="Arial"/>
-                <a:cs typeface="Arial"/>
-              </a:rPr>
-              <a:t>Renovate’s Friends</a:t>
-            </a:r>
-            <a:endParaRPr sz="1800" b="1">
-              <a:solidFill>
-                <a:srgbClr val="263238"/>
-              </a:solidFill>
-              <a:latin typeface="Arial"/>
-              <a:cs typeface="Arial"/>
-            </a:endParaRPr>
-          </a:p>
-        </p:txBody>
-      </p:sp>
     </p:spTree>
   </p:cSld>
   <p:clrMapOvr>
@@ -6920,7 +7226,7 @@
       </p:grpSpPr>
       <p:grpSp>
         <p:nvGrpSpPr>
-          <p:cNvPr id="1100089528" name=""/>
+          <p:cNvPr id="1961034305" name=""/>
           <p:cNvGrpSpPr/>
           <p:nvPr/>
         </p:nvGrpSpPr>
@@ -7036,14 +7342,14 @@
       </p:grpSp>
       <p:sp>
         <p:nvSpPr>
-          <p:cNvPr id="656903974" name=""/>
+          <p:cNvPr id="2090127467" name=""/>
           <p:cNvSpPr txBox="1"/>
           <p:nvPr/>
         </p:nvSpPr>
         <p:spPr bwMode="auto">
           <a:xfrm rot="0" flipH="0" flipV="0">
-            <a:off x="2687999" y="769189"/>
-            <a:ext cx="3163019" cy="396599"/>
+            <a:off x="2687998" y="769188"/>
+            <a:ext cx="3164098" cy="396599"/>
           </a:xfrm>
           <a:prstGeom prst="rect">
             <a:avLst/>
@@ -7059,16 +7365,24 @@
               <a:defRPr/>
             </a:pPr>
             <a:r>
-              <a:rPr lang="fr-CH" sz="2000" b="1"/>
+              <a:rPr lang="fr-CH" sz="2000" b="1">
+                <a:solidFill>
+                  <a:srgbClr val="263238"/>
+                </a:solidFill>
+              </a:rPr>
               <a:t>Development Workflow</a:t>
             </a:r>
-            <a:endParaRPr sz="2000" b="1"/>
-          </a:p>
-        </p:txBody>
-      </p:sp>
-      <p:sp>
-        <p:nvSpPr>
-          <p:cNvPr id="732463879" name=""/>
+            <a:endParaRPr sz="2000" b="1">
+              <a:solidFill>
+                <a:srgbClr val="263238"/>
+              </a:solidFill>
+            </a:endParaRPr>
+          </a:p>
+        </p:txBody>
+      </p:sp>
+      <p:sp>
+        <p:nvSpPr>
+          <p:cNvPr id="930832792" name=""/>
           <p:cNvSpPr/>
           <p:nvPr/>
         </p:nvSpPr>
@@ -7114,25 +7428,251 @@
         <p:txBody>
           <a:bodyPr vertOverflow="overflow" horzOverflow="overflow" vert="horz" wrap="square" lIns="91440" tIns="45720" rIns="91440" bIns="45720" numCol="1" spcCol="0" rtlCol="0" fromWordArt="0" anchor="ctr" anchorCtr="0" forceAA="0" upright="0" compatLnSpc="0"/>
           <a:p>
-            <a:pPr>
-              <a:defRPr/>
-            </a:pPr>
-            <a:endParaRPr/>
+            <a:pPr marL="683929" lvl="1" indent="-283879">
+              <a:lnSpc>
+                <a:spcPct val="200000"/>
+              </a:lnSpc>
+              <a:buFont typeface="Arial"/>
+              <a:buChar char="•"/>
+              <a:defRPr/>
+            </a:pPr>
+            <a:r>
+              <a:rPr lang="fr-CH" b="1">
+                <a:solidFill>
+                  <a:schemeClr val="tx1">
+                    <a:lumMod val="75000"/>
+                    <a:lumOff val="25000"/>
+                  </a:schemeClr>
+                </a:solidFill>
+              </a:rPr>
+              <a:t>Development Process: AGILE</a:t>
+            </a:r>
+            <a:endParaRPr b="1">
+              <a:solidFill>
+                <a:schemeClr val="tx1">
+                  <a:lumMod val="75000"/>
+                  <a:lumOff val="25000"/>
+                </a:schemeClr>
+              </a:solidFill>
+            </a:endParaRPr>
+          </a:p>
+          <a:p>
+            <a:pPr marL="683929" lvl="1" indent="-283879">
+              <a:lnSpc>
+                <a:spcPct val="200000"/>
+              </a:lnSpc>
+              <a:buFont typeface="Arial"/>
+              <a:buChar char="•"/>
+              <a:defRPr/>
+            </a:pPr>
+            <a:r>
+              <a:rPr lang="fr-CH" b="1">
+                <a:solidFill>
+                  <a:schemeClr val="tx1">
+                    <a:lumMod val="75000"/>
+                    <a:lumOff val="25000"/>
+                  </a:schemeClr>
+                </a:solidFill>
+              </a:rPr>
+              <a:t>2 Weeks Sprints</a:t>
+            </a:r>
+            <a:endParaRPr b="1">
+              <a:solidFill>
+                <a:schemeClr val="tx1">
+                  <a:lumMod val="75000"/>
+                  <a:lumOff val="25000"/>
+                </a:schemeClr>
+              </a:solidFill>
+            </a:endParaRPr>
+          </a:p>
+          <a:p>
+            <a:pPr marL="683929" lvl="1" indent="-283879">
+              <a:lnSpc>
+                <a:spcPct val="200000"/>
+              </a:lnSpc>
+              <a:buFont typeface="Arial"/>
+              <a:buChar char="•"/>
+              <a:defRPr/>
+            </a:pPr>
+            <a:r>
+              <a:rPr lang="fr-CH" b="1">
+                <a:solidFill>
+                  <a:schemeClr val="tx1">
+                    <a:lumMod val="75000"/>
+                    <a:lumOff val="25000"/>
+                  </a:schemeClr>
+                </a:solidFill>
+              </a:rPr>
+              <a:t>Kanban Board With Labels for Stories:</a:t>
+            </a:r>
+            <a:endParaRPr b="1">
+              <a:solidFill>
+                <a:schemeClr val="tx1">
+                  <a:lumMod val="75000"/>
+                  <a:lumOff val="25000"/>
+                </a:schemeClr>
+              </a:solidFill>
+            </a:endParaRPr>
+          </a:p>
+          <a:p>
+            <a:pPr marL="1083979" lvl="2" indent="-283879">
+              <a:lnSpc>
+                <a:spcPct val="200000"/>
+              </a:lnSpc>
+              <a:buFont typeface="Arial"/>
+              <a:buChar char="•"/>
+              <a:defRPr/>
+            </a:pPr>
+            <a:r>
+              <a:rPr lang="fr-CH" b="1">
+                <a:solidFill>
+                  <a:schemeClr val="tx1">
+                    <a:lumMod val="75000"/>
+                    <a:lumOff val="25000"/>
+                  </a:schemeClr>
+                </a:solidFill>
+              </a:rPr>
+              <a:t>Effort (1, 2, 3, 5, 8, 13)</a:t>
+            </a:r>
+            <a:endParaRPr b="1">
+              <a:solidFill>
+                <a:schemeClr val="tx1">
+                  <a:lumMod val="75000"/>
+                  <a:lumOff val="25000"/>
+                </a:schemeClr>
+              </a:solidFill>
+            </a:endParaRPr>
+          </a:p>
+          <a:p>
+            <a:pPr marL="1083979" lvl="2" indent="-283879">
+              <a:lnSpc>
+                <a:spcPct val="200000"/>
+              </a:lnSpc>
+              <a:buFont typeface="Arial"/>
+              <a:buChar char="•"/>
+              <a:defRPr/>
+            </a:pPr>
+            <a:r>
+              <a:rPr lang="fr-CH" b="1">
+                <a:solidFill>
+                  <a:schemeClr val="tx1">
+                    <a:lumMod val="75000"/>
+                    <a:lumOff val="25000"/>
+                  </a:schemeClr>
+                </a:solidFill>
+              </a:rPr>
+              <a:t>State (Approved, Blocked, Pending, Inactive, ...)</a:t>
+            </a:r>
+            <a:endParaRPr b="1">
+              <a:solidFill>
+                <a:schemeClr val="tx1">
+                  <a:lumMod val="75000"/>
+                  <a:lumOff val="25000"/>
+                </a:schemeClr>
+              </a:solidFill>
+            </a:endParaRPr>
+          </a:p>
+          <a:p>
+            <a:pPr marL="1083979" lvl="2" indent="-283879">
+              <a:lnSpc>
+                <a:spcPct val="200000"/>
+              </a:lnSpc>
+              <a:buFont typeface="Arial"/>
+              <a:buChar char="•"/>
+              <a:defRPr/>
+            </a:pPr>
+            <a:r>
+              <a:rPr lang="fr-CH" b="1">
+                <a:solidFill>
+                  <a:schemeClr val="tx1">
+                    <a:lumMod val="75000"/>
+                    <a:lumOff val="25000"/>
+                  </a:schemeClr>
+                </a:solidFill>
+              </a:rPr>
+              <a:t>Type (Feature, Fix, Tests, Docs, Discussions, ...)</a:t>
+            </a:r>
+            <a:endParaRPr b="1">
+              <a:solidFill>
+                <a:schemeClr val="tx1">
+                  <a:lumMod val="75000"/>
+                  <a:lumOff val="25000"/>
+                </a:schemeClr>
+              </a:solidFill>
+            </a:endParaRPr>
+          </a:p>
+          <a:p>
+            <a:pPr marL="1083979" lvl="2" indent="-283879">
+              <a:lnSpc>
+                <a:spcPct val="200000"/>
+              </a:lnSpc>
+              <a:buFont typeface="Arial"/>
+              <a:buChar char="•"/>
+              <a:defRPr/>
+            </a:pPr>
+            <a:r>
+              <a:rPr lang="fr-CH" b="1">
+                <a:solidFill>
+                  <a:schemeClr val="tx1">
+                    <a:lumMod val="75000"/>
+                    <a:lumOff val="25000"/>
+                  </a:schemeClr>
+                </a:solidFill>
+              </a:rPr>
+              <a:t>Priority (Now, Soon, Later, ...)</a:t>
+            </a:r>
+            <a:endParaRPr b="1">
+              <a:solidFill>
+                <a:schemeClr val="tx1">
+                  <a:lumMod val="75000"/>
+                  <a:lumOff val="25000"/>
+                </a:schemeClr>
+              </a:solidFill>
+            </a:endParaRPr>
+          </a:p>
+          <a:p>
+            <a:pPr marL="683929" lvl="1" indent="-283879">
+              <a:lnSpc>
+                <a:spcPct val="200000"/>
+              </a:lnSpc>
+              <a:buFont typeface="Arial"/>
+              <a:buChar char="•"/>
+              <a:defRPr/>
+            </a:pPr>
+            <a:r>
+              <a:rPr lang="fr-CH" b="1">
+                <a:solidFill>
+                  <a:schemeClr val="tx1">
+                    <a:lumMod val="75000"/>
+                    <a:lumOff val="25000"/>
+                  </a:schemeClr>
+                </a:solidFill>
+              </a:rPr>
+              <a:t>Conventional Commit Messages</a:t>
+            </a:r>
+            <a:endParaRPr b="1">
+              <a:solidFill>
+                <a:schemeClr val="tx1">
+                  <a:lumMod val="75000"/>
+                  <a:lumOff val="25000"/>
+                </a:schemeClr>
+              </a:solidFill>
+            </a:endParaRPr>
           </a:p>
         </p:txBody>
       </p:sp>
       <p:grpSp>
         <p:nvGrpSpPr>
-          <p:cNvPr id="323449327" name=""/>
+          <p:cNvPr id="1664322971" name=""/>
           <p:cNvGrpSpPr/>
           <p:nvPr/>
         </p:nvGrpSpPr>
         <p:grpSpPr bwMode="auto">
           <a:xfrm>
-            <a:off x="-93299" y="-133349"/>
-            <a:ext cx="2626949" cy="6976310"/>
+            <a:off x="-93298" y="-133348"/>
+            <a:ext cx="2626948" cy="6976309"/>
             <a:chOff x="0" y="0"/>
-            <a:chExt cx="2626949" cy="6976310"/>
+            <a:chExt cx="2626948" cy="6976309"/>
           </a:xfrm>
         </p:grpSpPr>
         <p:sp>
@@ -7152,6 +7692,13 @@
             <a:solidFill>
               <a:srgbClr val="263238"/>
             </a:solidFill>
+            <a:ln w="12700" cap="flat" cmpd="sng" algn="ctr">
+              <a:solidFill>
+                <a:srgbClr val="263238"/>
+              </a:solidFill>
+              <a:prstDash val="solid"/>
+              <a:miter lim="800000"/>
+            </a:ln>
           </p:spPr>
           <p:style>
             <a:lnRef idx="2">
@@ -7183,8 +7730,8 @@
             <a:stretch/>
           </p:blipFill>
           <p:spPr bwMode="auto">
-            <a:xfrm>
-              <a:off x="93299" y="133349"/>
+            <a:xfrm rot="0" flipH="0" flipV="0">
+              <a:off x="93298" y="133348"/>
               <a:ext cx="2533649" cy="676274"/>
             </a:xfrm>
             <a:prstGeom prst="rect">
@@ -7200,7 +7747,7 @@
           </p:nvSpPr>
           <p:spPr bwMode="auto">
             <a:xfrm rot="0" flipH="0" flipV="0">
-              <a:off x="93299" y="809624"/>
+              <a:off x="93298" y="809623"/>
               <a:ext cx="2533649" cy="551948"/>
             </a:xfrm>
             <a:prstGeom prst="rect">
@@ -7255,7 +7802,7 @@
           </p:nvSpPr>
           <p:spPr bwMode="auto">
             <a:xfrm rot="0" flipH="0" flipV="0">
-              <a:off x="93299" y="1361573"/>
+              <a:off x="93298" y="1361572"/>
               <a:ext cx="2533649" cy="551947"/>
             </a:xfrm>
             <a:prstGeom prst="rect">
@@ -7310,7 +7857,7 @@
           </p:nvSpPr>
           <p:spPr bwMode="auto">
             <a:xfrm rot="0" flipH="0" flipV="0">
-              <a:off x="93299" y="1913521"/>
+              <a:off x="93298" y="1913520"/>
               <a:ext cx="2533649" cy="551947"/>
             </a:xfrm>
             <a:prstGeom prst="rect">
@@ -7365,7 +7912,7 @@
           </p:nvSpPr>
           <p:spPr bwMode="auto">
             <a:xfrm rot="0" flipH="0" flipV="0">
-              <a:off x="93299" y="2465469"/>
+              <a:off x="93298" y="2465468"/>
               <a:ext cx="2533649" cy="551947"/>
             </a:xfrm>
             <a:prstGeom prst="rect">
@@ -7457,7 +8004,7 @@
       </p:grpSpPr>
       <p:grpSp>
         <p:nvGrpSpPr>
-          <p:cNvPr id="1973737104" name=""/>
+          <p:cNvPr id="1842125774" name=""/>
           <p:cNvGrpSpPr/>
           <p:nvPr/>
         </p:nvGrpSpPr>
@@ -7573,14 +8120,14 @@
       </p:grpSp>
       <p:sp>
         <p:nvSpPr>
-          <p:cNvPr id="1500170481" name=""/>
+          <p:cNvPr id="703884591" name=""/>
           <p:cNvSpPr txBox="1"/>
           <p:nvPr/>
         </p:nvSpPr>
         <p:spPr bwMode="auto">
           <a:xfrm rot="0" flipH="0" flipV="0">
-            <a:off x="2687999" y="769189"/>
-            <a:ext cx="3169139" cy="396599"/>
+            <a:off x="2687998" y="769188"/>
+            <a:ext cx="3169498" cy="396599"/>
           </a:xfrm>
           <a:prstGeom prst="rect">
             <a:avLst/>
@@ -7596,80 +8143,756 @@
               <a:defRPr/>
             </a:pPr>
             <a:r>
-              <a:rPr lang="fr-CH" sz="2000" b="1"/>
+              <a:rPr lang="fr-CH" sz="2000" b="1">
+                <a:solidFill>
+                  <a:srgbClr val="263238"/>
+                </a:solidFill>
+              </a:rPr>
               <a:t>Project Structure</a:t>
             </a:r>
-            <a:endParaRPr sz="2000" b="1"/>
-          </a:p>
-        </p:txBody>
-      </p:sp>
-      <p:sp>
-        <p:nvSpPr>
-          <p:cNvPr id="1491297453" name=""/>
-          <p:cNvSpPr/>
+            <a:endParaRPr sz="2000" b="1">
+              <a:solidFill>
+                <a:srgbClr val="263238"/>
+              </a:solidFill>
+            </a:endParaRPr>
+          </a:p>
+        </p:txBody>
+      </p:sp>
+      <p:sp>
+        <p:nvSpPr>
+          <p:cNvPr id="1246325656" name=""/>
+          <p:cNvSpPr txBox="1"/>
           <p:nvPr/>
         </p:nvSpPr>
         <p:spPr bwMode="auto">
           <a:xfrm rot="0" flipH="0" flipV="0">
-            <a:off x="2687999" y="1504197"/>
-            <a:ext cx="9336916" cy="5182352"/>
+            <a:off x="2687998" y="1138076"/>
+            <a:ext cx="2277183" cy="366119"/>
           </a:xfrm>
-          <a:prstGeom prst="roundRect">
-            <a:avLst>
-              <a:gd name="adj" fmla="val 4157"/>
-            </a:avLst>
+          <a:prstGeom prst="rect">
+            <a:avLst/>
           </a:prstGeom>
-          <a:solidFill>
-            <a:schemeClr val="bg1"/>
-          </a:solidFill>
-          <a:ln w="12700" cap="flat" cmpd="sng" algn="ctr">
-            <a:solidFill>
-              <a:schemeClr val="bg1">
-                <a:lumMod val="74901"/>
-              </a:schemeClr>
-            </a:solidFill>
-            <a:prstDash val="solid"/>
-            <a:miter lim="800000"/>
-          </a:ln>
+          <a:noFill/>
         </p:spPr>
-        <p:style>
-          <a:lnRef idx="2">
-            <a:schemeClr val="accent1">
-              <a:shade val="50000"/>
-            </a:schemeClr>
-          </a:lnRef>
-          <a:fillRef idx="1">
-            <a:schemeClr val="accent1"/>
-          </a:fillRef>
-          <a:effectRef idx="0">
-            <a:schemeClr val="accent1"/>
-          </a:effectRef>
-          <a:fontRef idx="minor">
-            <a:schemeClr val="lt1"/>
-          </a:fontRef>
-        </p:style>
-        <p:txBody>
-          <a:bodyPr vertOverflow="overflow" horzOverflow="overflow" vert="horz" wrap="square" lIns="91440" tIns="45720" rIns="91440" bIns="45720" numCol="1" spcCol="0" rtlCol="0" fromWordArt="0" anchor="ctr" anchorCtr="0" forceAA="0" upright="0" compatLnSpc="0"/>
+        <p:txBody>
+          <a:bodyPr vertOverflow="overflow" horzOverflow="overflow" vert="horz" wrap="square" lIns="91440" tIns="45720" rIns="91440" bIns="45720" numCol="1" spcCol="0" rtlCol="0" fromWordArt="0" anchor="t" anchorCtr="0" forceAA="0" upright="0" compatLnSpc="0">
+            <a:spAutoFit/>
+          </a:bodyPr>
           <a:p>
             <a:pPr>
               <a:defRPr/>
             </a:pPr>
-            <a:endParaRPr/>
+            <a:r>
+              <a:rPr lang="fr-CH" b="1">
+                <a:solidFill>
+                  <a:schemeClr val="tx1">
+                    <a:lumMod val="65000"/>
+                    <a:lumOff val="35000"/>
+                  </a:schemeClr>
+                </a:solidFill>
+              </a:rPr>
+              <a:t>Our Repositories</a:t>
+            </a:r>
+            <a:endParaRPr b="1">
+              <a:solidFill>
+                <a:schemeClr val="tx1">
+                  <a:lumMod val="65000"/>
+                  <a:lumOff val="35000"/>
+                </a:schemeClr>
+              </a:solidFill>
+            </a:endParaRPr>
           </a:p>
         </p:txBody>
       </p:sp>
       <p:grpSp>
         <p:nvGrpSpPr>
-          <p:cNvPr id="491759741" name=""/>
+          <p:cNvPr id="1730541617" name=""/>
           <p:cNvGrpSpPr/>
           <p:nvPr/>
         </p:nvGrpSpPr>
         <p:grpSpPr bwMode="auto">
           <a:xfrm>
-            <a:off x="-93299" y="-133349"/>
-            <a:ext cx="2626949" cy="6976310"/>
+            <a:off x="2696162" y="1504196"/>
+            <a:ext cx="9347800" cy="5178639"/>
             <a:chOff x="0" y="0"/>
-            <a:chExt cx="2626949" cy="6976310"/>
+            <a:chExt cx="9347800" cy="5178639"/>
+          </a:xfrm>
+        </p:grpSpPr>
+        <p:grpSp>
+          <p:nvGrpSpPr>
+            <p:cNvPr id="1631957629" name=""/>
+            <p:cNvGrpSpPr/>
+            <p:nvPr/>
+          </p:nvGrpSpPr>
+          <p:grpSpPr bwMode="auto">
+            <a:xfrm>
+              <a:off x="0" y="0"/>
+              <a:ext cx="9328751" cy="1526483"/>
+              <a:chOff x="0" y="0"/>
+              <a:chExt cx="9328751" cy="1526483"/>
+            </a:xfrm>
+          </p:grpSpPr>
+          <p:sp>
+            <p:nvSpPr>
+              <p:cNvPr id="429760784" name=""/>
+              <p:cNvSpPr/>
+              <p:nvPr/>
+            </p:nvSpPr>
+            <p:spPr bwMode="auto">
+              <a:xfrm rot="0" flipH="0" flipV="0">
+                <a:off x="0" y="0"/>
+                <a:ext cx="2829729" cy="1526483"/>
+              </a:xfrm>
+              <a:prstGeom prst="roundRect">
+                <a:avLst>
+                  <a:gd name="adj" fmla="val 14948"/>
+                </a:avLst>
+              </a:prstGeom>
+              <a:solidFill>
+                <a:schemeClr val="bg1"/>
+              </a:solidFill>
+              <a:ln w="12700" cap="flat" cmpd="sng" algn="ctr">
+                <a:solidFill>
+                  <a:schemeClr val="bg1">
+                    <a:lumMod val="74901"/>
+                  </a:schemeClr>
+                </a:solidFill>
+                <a:prstDash val="solid"/>
+                <a:miter lim="800000"/>
+              </a:ln>
+            </p:spPr>
+            <p:style>
+              <a:lnRef idx="2">
+                <a:schemeClr val="accent1">
+                  <a:shade val="50000"/>
+                </a:schemeClr>
+              </a:lnRef>
+              <a:fillRef idx="1">
+                <a:schemeClr val="accent1"/>
+              </a:fillRef>
+              <a:effectRef idx="0">
+                <a:schemeClr val="accent1"/>
+              </a:effectRef>
+              <a:fontRef idx="minor">
+                <a:schemeClr val="lt1"/>
+              </a:fontRef>
+            </p:style>
+            <p:txBody>
+              <a:bodyPr vertOverflow="overflow" horzOverflow="overflow" vert="horz" wrap="square" lIns="91440" tIns="45720" rIns="91440" bIns="45720" numCol="1" spcCol="0" rtlCol="0" fromWordArt="0" anchor="ctr" anchorCtr="0" forceAA="0" upright="0" compatLnSpc="0"/>
+              <a:p>
+                <a:pPr algn="ctr">
+                  <a:defRPr/>
+                </a:pPr>
+                <a:r>
+                  <a:rPr lang="fr-CH">
+                    <a:solidFill>
+                      <a:srgbClr val="263238"/>
+                    </a:solidFill>
+                  </a:rPr>
+                  <a:t>.github</a:t>
+                </a:r>
+                <a:endParaRPr>
+                  <a:solidFill>
+                    <a:srgbClr val="263238"/>
+                  </a:solidFill>
+                </a:endParaRPr>
+              </a:p>
+            </p:txBody>
+          </p:sp>
+          <p:sp>
+            <p:nvSpPr>
+              <p:cNvPr id="1308940194" name=""/>
+              <p:cNvSpPr/>
+              <p:nvPr/>
+            </p:nvSpPr>
+            <p:spPr bwMode="auto">
+              <a:xfrm rot="0" flipH="0" flipV="0">
+                <a:off x="3245429" y="0"/>
+                <a:ext cx="2829728" cy="1526482"/>
+              </a:xfrm>
+              <a:prstGeom prst="roundRect">
+                <a:avLst>
+                  <a:gd name="adj" fmla="val 14948"/>
+                </a:avLst>
+              </a:prstGeom>
+              <a:solidFill>
+                <a:schemeClr val="bg1"/>
+              </a:solidFill>
+              <a:ln w="12700" cap="flat" cmpd="sng" algn="ctr">
+                <a:solidFill>
+                  <a:schemeClr val="bg1">
+                    <a:lumMod val="74901"/>
+                  </a:schemeClr>
+                </a:solidFill>
+                <a:prstDash val="solid"/>
+                <a:miter lim="800000"/>
+              </a:ln>
+            </p:spPr>
+            <p:style>
+              <a:lnRef idx="2">
+                <a:schemeClr val="accent1">
+                  <a:shade val="50000"/>
+                </a:schemeClr>
+              </a:lnRef>
+              <a:fillRef idx="1">
+                <a:schemeClr val="accent1"/>
+              </a:fillRef>
+              <a:effectRef idx="0">
+                <a:schemeClr val="accent1"/>
+              </a:effectRef>
+              <a:fontRef idx="minor">
+                <a:schemeClr val="lt1"/>
+              </a:fontRef>
+            </p:style>
+            <p:txBody>
+              <a:bodyPr vertOverflow="overflow" horzOverflow="overflow" vert="horz" wrap="square" lIns="91440" tIns="45720" rIns="91440" bIns="45720" numCol="1" spcCol="0" rtlCol="0" fromWordArt="0" anchor="ctr" anchorCtr="0" forceAA="0" upright="0" compatLnSpc="0"/>
+              <a:p>
+                <a:pPr algn="ctr">
+                  <a:defRPr/>
+                </a:pPr>
+                <a:r>
+                  <a:rPr lang="fr-CH">
+                    <a:solidFill>
+                      <a:srgbClr val="263238"/>
+                    </a:solidFill>
+                  </a:rPr>
+                  <a:t>Project-management</a:t>
+                </a:r>
+                <a:endParaRPr>
+                  <a:solidFill>
+                    <a:srgbClr val="263238"/>
+                  </a:solidFill>
+                </a:endParaRPr>
+              </a:p>
+            </p:txBody>
+          </p:sp>
+          <p:sp>
+            <p:nvSpPr>
+              <p:cNvPr id="1220678783" name=""/>
+              <p:cNvSpPr/>
+              <p:nvPr/>
+            </p:nvSpPr>
+            <p:spPr bwMode="auto">
+              <a:xfrm rot="0" flipH="0" flipV="0">
+                <a:off x="6499022" y="0"/>
+                <a:ext cx="2829728" cy="1526482"/>
+              </a:xfrm>
+              <a:prstGeom prst="roundRect">
+                <a:avLst>
+                  <a:gd name="adj" fmla="val 14948"/>
+                </a:avLst>
+              </a:prstGeom>
+              <a:solidFill>
+                <a:schemeClr val="bg1"/>
+              </a:solidFill>
+              <a:ln w="12700" cap="flat" cmpd="sng" algn="ctr">
+                <a:solidFill>
+                  <a:schemeClr val="bg1">
+                    <a:lumMod val="74901"/>
+                  </a:schemeClr>
+                </a:solidFill>
+                <a:prstDash val="solid"/>
+                <a:miter lim="800000"/>
+              </a:ln>
+            </p:spPr>
+            <p:style>
+              <a:lnRef idx="2">
+                <a:schemeClr val="accent1">
+                  <a:shade val="50000"/>
+                </a:schemeClr>
+              </a:lnRef>
+              <a:fillRef idx="1">
+                <a:schemeClr val="accent1"/>
+              </a:fillRef>
+              <a:effectRef idx="0">
+                <a:schemeClr val="accent1"/>
+              </a:effectRef>
+              <a:fontRef idx="minor">
+                <a:schemeClr val="lt1"/>
+              </a:fontRef>
+            </p:style>
+            <p:txBody>
+              <a:bodyPr vertOverflow="overflow" horzOverflow="overflow" vert="horz" wrap="square" lIns="91440" tIns="45720" rIns="91440" bIns="45720" numCol="1" spcCol="0" rtlCol="0" fromWordArt="0" anchor="ctr" anchorCtr="0" forceAA="0" upright="0" compatLnSpc="0"/>
+              <a:p>
+                <a:pPr algn="ctr">
+                  <a:defRPr/>
+                </a:pPr>
+                <a:r>
+                  <a:rPr lang="fr-CH">
+                    <a:solidFill>
+                      <a:srgbClr val="263238"/>
+                    </a:solidFill>
+                  </a:rPr>
+                  <a:t>Github-org-management</a:t>
+                </a:r>
+                <a:endParaRPr>
+                  <a:solidFill>
+                    <a:srgbClr val="263238"/>
+                  </a:solidFill>
+                </a:endParaRPr>
+              </a:p>
+            </p:txBody>
+          </p:sp>
+        </p:grpSp>
+        <p:grpSp>
+          <p:nvGrpSpPr>
+            <p:cNvPr id="1406339672" name=""/>
+            <p:cNvGrpSpPr/>
+            <p:nvPr/>
+          </p:nvGrpSpPr>
+          <p:grpSpPr bwMode="auto">
+            <a:xfrm>
+              <a:off x="0" y="1827934"/>
+              <a:ext cx="9328750" cy="1526483"/>
+              <a:chOff x="0" y="0"/>
+              <a:chExt cx="9328750" cy="1526483"/>
+            </a:xfrm>
+          </p:grpSpPr>
+          <p:sp>
+            <p:nvSpPr>
+              <p:cNvPr id="1311145880" name=""/>
+              <p:cNvSpPr/>
+              <p:nvPr/>
+            </p:nvSpPr>
+            <p:spPr bwMode="auto">
+              <a:xfrm rot="0" flipH="0" flipV="0">
+                <a:off x="0" y="0"/>
+                <a:ext cx="2829728" cy="1526482"/>
+              </a:xfrm>
+              <a:prstGeom prst="roundRect">
+                <a:avLst>
+                  <a:gd name="adj" fmla="val 14948"/>
+                </a:avLst>
+              </a:prstGeom>
+              <a:solidFill>
+                <a:schemeClr val="bg1"/>
+              </a:solidFill>
+              <a:ln w="12700" cap="flat" cmpd="sng" algn="ctr">
+                <a:solidFill>
+                  <a:schemeClr val="bg1">
+                    <a:lumMod val="74901"/>
+                  </a:schemeClr>
+                </a:solidFill>
+                <a:prstDash val="solid"/>
+                <a:miter lim="800000"/>
+              </a:ln>
+            </p:spPr>
+            <p:style>
+              <a:lnRef idx="2">
+                <a:schemeClr val="accent1">
+                  <a:shade val="50000"/>
+                </a:schemeClr>
+              </a:lnRef>
+              <a:fillRef idx="1">
+                <a:schemeClr val="accent1"/>
+              </a:fillRef>
+              <a:effectRef idx="0">
+                <a:schemeClr val="accent1"/>
+              </a:effectRef>
+              <a:fontRef idx="minor">
+                <a:schemeClr val="lt1"/>
+              </a:fontRef>
+            </p:style>
+            <p:txBody>
+              <a:bodyPr vertOverflow="overflow" horzOverflow="overflow" vert="horz" wrap="square" lIns="91440" tIns="45720" rIns="91440" bIns="45720" numCol="1" spcCol="0" rtlCol="0" fromWordArt="0" anchor="ctr" anchorCtr="0" forceAA="0" upright="0" compatLnSpc="0"/>
+              <a:p>
+                <a:pPr algn="ctr">
+                  <a:defRPr/>
+                </a:pPr>
+                <a:r>
+                  <a:rPr lang="fr-CH">
+                    <a:solidFill>
+                      <a:srgbClr val="263238"/>
+                    </a:solidFill>
+                  </a:rPr>
+                  <a:t>Github-actions-workflow</a:t>
+                </a:r>
+                <a:endParaRPr>
+                  <a:solidFill>
+                    <a:srgbClr val="263238"/>
+                  </a:solidFill>
+                </a:endParaRPr>
+              </a:p>
+            </p:txBody>
+          </p:sp>
+          <p:sp>
+            <p:nvSpPr>
+              <p:cNvPr id="881653870" name=""/>
+              <p:cNvSpPr/>
+              <p:nvPr/>
+            </p:nvSpPr>
+            <p:spPr bwMode="auto">
+              <a:xfrm rot="0" flipH="0" flipV="0">
+                <a:off x="3245428" y="0"/>
+                <a:ext cx="2829728" cy="1526482"/>
+              </a:xfrm>
+              <a:prstGeom prst="roundRect">
+                <a:avLst>
+                  <a:gd name="adj" fmla="val 14948"/>
+                </a:avLst>
+              </a:prstGeom>
+              <a:solidFill>
+                <a:srgbClr val="263238"/>
+              </a:solidFill>
+              <a:ln w="12700" cap="flat" cmpd="sng" algn="ctr">
+                <a:solidFill>
+                  <a:schemeClr val="bg1">
+                    <a:lumMod val="74901"/>
+                  </a:schemeClr>
+                </a:solidFill>
+                <a:prstDash val="solid"/>
+                <a:miter lim="800000"/>
+              </a:ln>
+            </p:spPr>
+            <p:style>
+              <a:lnRef idx="2">
+                <a:schemeClr val="accent1">
+                  <a:shade val="50000"/>
+                </a:schemeClr>
+              </a:lnRef>
+              <a:fillRef idx="1">
+                <a:schemeClr val="accent1"/>
+              </a:fillRef>
+              <a:effectRef idx="0">
+                <a:schemeClr val="accent1"/>
+              </a:effectRef>
+              <a:fontRef idx="minor">
+                <a:schemeClr val="lt1"/>
+              </a:fontRef>
+            </p:style>
+            <p:txBody>
+              <a:bodyPr/>
+              <a:p>
+                <a:pPr>
+                  <a:defRPr/>
+                </a:pPr>
+                <a:endParaRPr>
+                  <a:solidFill>
+                    <a:srgbClr val="263238"/>
+                  </a:solidFill>
+                </a:endParaRPr>
+              </a:p>
+            </p:txBody>
+          </p:sp>
+          <p:sp>
+            <p:nvSpPr>
+              <p:cNvPr id="1736746895" name=""/>
+              <p:cNvSpPr/>
+              <p:nvPr/>
+            </p:nvSpPr>
+            <p:spPr bwMode="auto">
+              <a:xfrm rot="0" flipH="0" flipV="0">
+                <a:off x="6499021" y="0"/>
+                <a:ext cx="2829728" cy="1526482"/>
+              </a:xfrm>
+              <a:prstGeom prst="roundRect">
+                <a:avLst>
+                  <a:gd name="adj" fmla="val 14948"/>
+                </a:avLst>
+              </a:prstGeom>
+              <a:solidFill>
+                <a:schemeClr val="bg1"/>
+              </a:solidFill>
+              <a:ln w="12700" cap="flat" cmpd="sng" algn="ctr">
+                <a:solidFill>
+                  <a:schemeClr val="bg1">
+                    <a:lumMod val="74901"/>
+                  </a:schemeClr>
+                </a:solidFill>
+                <a:prstDash val="solid"/>
+                <a:miter lim="800000"/>
+              </a:ln>
+            </p:spPr>
+            <p:style>
+              <a:lnRef idx="2">
+                <a:schemeClr val="accent1">
+                  <a:shade val="50000"/>
+                </a:schemeClr>
+              </a:lnRef>
+              <a:fillRef idx="1">
+                <a:schemeClr val="accent1"/>
+              </a:fillRef>
+              <a:effectRef idx="0">
+                <a:schemeClr val="accent1"/>
+              </a:effectRef>
+              <a:fontRef idx="minor">
+                <a:schemeClr val="lt1"/>
+              </a:fontRef>
+            </p:style>
+            <p:txBody>
+              <a:bodyPr vertOverflow="overflow" horzOverflow="overflow" vert="horz" wrap="square" lIns="91440" tIns="45720" rIns="91440" bIns="45720" numCol="1" spcCol="0" rtlCol="0" fromWordArt="0" anchor="ctr" anchorCtr="0" forceAA="0" upright="0" compatLnSpc="0"/>
+              <a:p>
+                <a:pPr algn="ctr">
+                  <a:defRPr/>
+                </a:pPr>
+                <a:r>
+                  <a:rPr lang="fr-CH">
+                    <a:solidFill>
+                      <a:srgbClr val="263238"/>
+                    </a:solidFill>
+                  </a:rPr>
+                  <a:t>Backend</a:t>
+                </a:r>
+                <a:endParaRPr>
+                  <a:solidFill>
+                    <a:srgbClr val="263238"/>
+                  </a:solidFill>
+                </a:endParaRPr>
+              </a:p>
+            </p:txBody>
+          </p:sp>
+        </p:grpSp>
+        <p:grpSp>
+          <p:nvGrpSpPr>
+            <p:cNvPr id="547235511" name=""/>
+            <p:cNvGrpSpPr/>
+            <p:nvPr/>
+          </p:nvGrpSpPr>
+          <p:grpSpPr bwMode="auto">
+            <a:xfrm>
+              <a:off x="19049" y="3652156"/>
+              <a:ext cx="9328750" cy="1526483"/>
+              <a:chOff x="0" y="0"/>
+              <a:chExt cx="9328750" cy="1526483"/>
+            </a:xfrm>
+          </p:grpSpPr>
+          <p:sp>
+            <p:nvSpPr>
+              <p:cNvPr id="444701906" name=""/>
+              <p:cNvSpPr/>
+              <p:nvPr/>
+            </p:nvSpPr>
+            <p:spPr bwMode="auto">
+              <a:xfrm rot="0" flipH="0" flipV="0">
+                <a:off x="0" y="0"/>
+                <a:ext cx="2829728" cy="1526482"/>
+              </a:xfrm>
+              <a:prstGeom prst="roundRect">
+                <a:avLst>
+                  <a:gd name="adj" fmla="val 14948"/>
+                </a:avLst>
+              </a:prstGeom>
+              <a:solidFill>
+                <a:schemeClr val="bg1"/>
+              </a:solidFill>
+              <a:ln w="12700" cap="flat" cmpd="sng" algn="ctr">
+                <a:solidFill>
+                  <a:schemeClr val="bg1">
+                    <a:lumMod val="74901"/>
+                  </a:schemeClr>
+                </a:solidFill>
+                <a:prstDash val="solid"/>
+                <a:miter lim="800000"/>
+              </a:ln>
+            </p:spPr>
+            <p:style>
+              <a:lnRef idx="2">
+                <a:schemeClr val="accent1">
+                  <a:shade val="50000"/>
+                </a:schemeClr>
+              </a:lnRef>
+              <a:fillRef idx="1">
+                <a:schemeClr val="accent1"/>
+              </a:fillRef>
+              <a:effectRef idx="0">
+                <a:schemeClr val="accent1"/>
+              </a:effectRef>
+              <a:fontRef idx="minor">
+                <a:schemeClr val="lt1"/>
+              </a:fontRef>
+            </p:style>
+            <p:txBody>
+              <a:bodyPr vertOverflow="overflow" horzOverflow="overflow" vert="horz" wrap="square" lIns="91440" tIns="45720" rIns="91440" bIns="45720" numCol="1" spcCol="0" rtlCol="0" fromWordArt="0" anchor="ctr" anchorCtr="0" forceAA="0" upright="0" compatLnSpc="0"/>
+              <a:p>
+                <a:pPr algn="ctr">
+                  <a:defRPr/>
+                </a:pPr>
+                <a:r>
+                  <a:rPr lang="fr-CH">
+                    <a:solidFill>
+                      <a:srgbClr val="263238"/>
+                    </a:solidFill>
+                  </a:rPr>
+                  <a:t>Frontend</a:t>
+                </a:r>
+                <a:endParaRPr>
+                  <a:solidFill>
+                    <a:srgbClr val="263238"/>
+                  </a:solidFill>
+                </a:endParaRPr>
+              </a:p>
+            </p:txBody>
+          </p:sp>
+          <p:sp>
+            <p:nvSpPr>
+              <p:cNvPr id="744748298" name=""/>
+              <p:cNvSpPr/>
+              <p:nvPr/>
+            </p:nvSpPr>
+            <p:spPr bwMode="auto">
+              <a:xfrm rot="0" flipH="0" flipV="0">
+                <a:off x="3245428" y="0"/>
+                <a:ext cx="2829728" cy="1526482"/>
+              </a:xfrm>
+              <a:prstGeom prst="roundRect">
+                <a:avLst>
+                  <a:gd name="adj" fmla="val 14948"/>
+                </a:avLst>
+              </a:prstGeom>
+              <a:solidFill>
+                <a:schemeClr val="bg1"/>
+              </a:solidFill>
+              <a:ln w="12700" cap="flat" cmpd="sng" algn="ctr">
+                <a:solidFill>
+                  <a:schemeClr val="bg1">
+                    <a:lumMod val="74901"/>
+                  </a:schemeClr>
+                </a:solidFill>
+                <a:prstDash val="solid"/>
+                <a:miter lim="800000"/>
+              </a:ln>
+            </p:spPr>
+            <p:style>
+              <a:lnRef idx="2">
+                <a:schemeClr val="accent1">
+                  <a:shade val="50000"/>
+                </a:schemeClr>
+              </a:lnRef>
+              <a:fillRef idx="1">
+                <a:schemeClr val="accent1"/>
+              </a:fillRef>
+              <a:effectRef idx="0">
+                <a:schemeClr val="accent1"/>
+              </a:effectRef>
+              <a:fontRef idx="minor">
+                <a:schemeClr val="lt1"/>
+              </a:fontRef>
+            </p:style>
+            <p:txBody>
+              <a:bodyPr vertOverflow="overflow" horzOverflow="overflow" vert="horz" wrap="square" lIns="91440" tIns="45720" rIns="91440" bIns="45720" numCol="1" spcCol="0" rtlCol="0" fromWordArt="0" anchor="ctr" anchorCtr="0" forceAA="0" upright="0" compatLnSpc="0"/>
+              <a:p>
+                <a:pPr algn="ctr">
+                  <a:defRPr/>
+                </a:pPr>
+                <a:r>
+                  <a:rPr lang="fr-CH">
+                    <a:solidFill>
+                      <a:srgbClr val="263238"/>
+                    </a:solidFill>
+                  </a:rPr>
+                  <a:t>Infrastructure</a:t>
+                </a:r>
+                <a:endParaRPr>
+                  <a:solidFill>
+                    <a:srgbClr val="263238"/>
+                  </a:solidFill>
+                </a:endParaRPr>
+              </a:p>
+            </p:txBody>
+          </p:sp>
+          <p:sp>
+            <p:nvSpPr>
+              <p:cNvPr id="1452710567" name=""/>
+              <p:cNvSpPr/>
+              <p:nvPr/>
+            </p:nvSpPr>
+            <p:spPr bwMode="auto">
+              <a:xfrm rot="0" flipH="0" flipV="0">
+                <a:off x="6499021" y="0"/>
+                <a:ext cx="2829728" cy="1526482"/>
+              </a:xfrm>
+              <a:prstGeom prst="roundRect">
+                <a:avLst>
+                  <a:gd name="adj" fmla="val 14948"/>
+                </a:avLst>
+              </a:prstGeom>
+              <a:solidFill>
+                <a:schemeClr val="bg1"/>
+              </a:solidFill>
+              <a:ln w="12700" cap="flat" cmpd="sng" algn="ctr">
+                <a:solidFill>
+                  <a:schemeClr val="bg1">
+                    <a:lumMod val="74901"/>
+                  </a:schemeClr>
+                </a:solidFill>
+                <a:prstDash val="solid"/>
+                <a:miter lim="800000"/>
+              </a:ln>
+            </p:spPr>
+            <p:style>
+              <a:lnRef idx="2">
+                <a:schemeClr val="accent1">
+                  <a:shade val="50000"/>
+                </a:schemeClr>
+              </a:lnRef>
+              <a:fillRef idx="1">
+                <a:schemeClr val="accent1"/>
+              </a:fillRef>
+              <a:effectRef idx="0">
+                <a:schemeClr val="accent1"/>
+              </a:effectRef>
+              <a:fontRef idx="minor">
+                <a:schemeClr val="lt1"/>
+              </a:fontRef>
+            </p:style>
+            <p:txBody>
+              <a:bodyPr vertOverflow="overflow" horzOverflow="overflow" vert="horz" wrap="square" lIns="91440" tIns="45720" rIns="91440" bIns="45720" numCol="1" spcCol="0" rtlCol="0" fromWordArt="0" anchor="ctr" anchorCtr="0" forceAA="0" upright="0" compatLnSpc="0"/>
+              <a:p>
+                <a:pPr algn="ctr">
+                  <a:defRPr/>
+                </a:pPr>
+                <a:r>
+                  <a:rPr lang="fr-CH">
+                    <a:solidFill>
+                      <a:srgbClr val="263238"/>
+                    </a:solidFill>
+                  </a:rPr>
+                  <a:t>Website</a:t>
+                </a:r>
+                <a:endParaRPr>
+                  <a:solidFill>
+                    <a:srgbClr val="263238"/>
+                  </a:solidFill>
+                </a:endParaRPr>
+              </a:p>
+            </p:txBody>
+          </p:sp>
+        </p:grpSp>
+      </p:grpSp>
+      <p:pic>
+        <p:nvPicPr>
+          <p:cNvPr id="117089808" name=""/>
+          <p:cNvPicPr>
+            <a:picLocks noChangeAspect="1"/>
+          </p:cNvPicPr>
+          <p:nvPr/>
+        </p:nvPicPr>
+        <p:blipFill>
+          <a:blip r:embed="rId3"/>
+          <a:stretch/>
+        </p:blipFill>
+        <p:spPr bwMode="auto">
+          <a:xfrm flipH="0" flipV="0">
+            <a:off x="6549264" y="3272717"/>
+            <a:ext cx="1641598" cy="1641598"/>
+          </a:xfrm>
+          <a:prstGeom prst="rect">
+            <a:avLst/>
+          </a:prstGeom>
+        </p:spPr>
+      </p:pic>
+      <p:grpSp>
+        <p:nvGrpSpPr>
+          <p:cNvPr id="1094568097" name=""/>
+          <p:cNvGrpSpPr/>
+          <p:nvPr/>
+        </p:nvGrpSpPr>
+        <p:grpSpPr bwMode="auto">
+          <a:xfrm>
+            <a:off x="-93298" y="-133348"/>
+            <a:ext cx="2626948" cy="6976309"/>
+            <a:chOff x="0" y="0"/>
+            <a:chExt cx="2626948" cy="6976309"/>
           </a:xfrm>
         </p:grpSpPr>
         <p:sp>
@@ -7689,6 +8912,13 @@
             <a:solidFill>
               <a:srgbClr val="263238"/>
             </a:solidFill>
+            <a:ln w="12700" cap="flat" cmpd="sng" algn="ctr">
+              <a:solidFill>
+                <a:srgbClr val="263238"/>
+              </a:solidFill>
+              <a:prstDash val="solid"/>
+              <a:miter lim="800000"/>
+            </a:ln>
           </p:spPr>
           <p:style>
             <a:lnRef idx="2">
@@ -7716,12 +8946,12 @@
             <p:nvPr/>
           </p:nvPicPr>
           <p:blipFill>
-            <a:blip r:embed="rId3"/>
+            <a:blip r:embed="rId4"/>
             <a:stretch/>
           </p:blipFill>
           <p:spPr bwMode="auto">
-            <a:xfrm>
-              <a:off x="93299" y="133349"/>
+            <a:xfrm rot="0" flipH="0" flipV="0">
+              <a:off x="93298" y="133348"/>
               <a:ext cx="2533649" cy="676274"/>
             </a:xfrm>
             <a:prstGeom prst="rect">
@@ -7737,7 +8967,7 @@
           </p:nvSpPr>
           <p:spPr bwMode="auto">
             <a:xfrm rot="0" flipH="0" flipV="0">
-              <a:off x="93299" y="809624"/>
+              <a:off x="93298" y="809623"/>
               <a:ext cx="2533649" cy="551948"/>
             </a:xfrm>
             <a:prstGeom prst="rect">
@@ -7792,7 +9022,7 @@
           </p:nvSpPr>
           <p:spPr bwMode="auto">
             <a:xfrm rot="0" flipH="0" flipV="0">
-              <a:off x="93299" y="1361573"/>
+              <a:off x="93298" y="1361572"/>
               <a:ext cx="2533649" cy="551947"/>
             </a:xfrm>
             <a:prstGeom prst="rect">
@@ -7847,7 +9077,7 @@
           </p:nvSpPr>
           <p:spPr bwMode="auto">
             <a:xfrm rot="0" flipH="0" flipV="0">
-              <a:off x="93299" y="1913521"/>
+              <a:off x="93298" y="1913520"/>
               <a:ext cx="2533649" cy="551947"/>
             </a:xfrm>
             <a:prstGeom prst="rect">
@@ -7902,7 +9132,7 @@
           </p:nvSpPr>
           <p:spPr bwMode="auto">
             <a:xfrm rot="0" flipH="0" flipV="0">
-              <a:off x="93299" y="2465469"/>
+              <a:off x="93298" y="2465468"/>
               <a:ext cx="2533649" cy="551947"/>
             </a:xfrm>
             <a:prstGeom prst="rect">

</xml_diff>